<commit_message>
Salvando alteraçõe do PowerPoint
</commit_message>
<xml_diff>
--- a/modelo.pptx
+++ b/modelo.pptx
@@ -302,7 +302,7 @@
           <a:p>
             <a:fld id="{305DF9F5-3E2B-4E4D-9267-415E2A13194D}" type="datetimeFigureOut">
               <a:rPr lang="pt-BR" smtClean="0"/>
-              <a:t>11/04/2019</a:t>
+              <a:t>13/04/2019</a:t>
             </a:fld>
             <a:endParaRPr lang="pt-BR"/>
           </a:p>
@@ -470,7 +470,7 @@
           <a:p>
             <a:fld id="{305DF9F5-3E2B-4E4D-9267-415E2A13194D}" type="datetimeFigureOut">
               <a:rPr lang="pt-BR" smtClean="0"/>
-              <a:t>11/04/2019</a:t>
+              <a:t>13/04/2019</a:t>
             </a:fld>
             <a:endParaRPr lang="pt-BR"/>
           </a:p>
@@ -648,7 +648,7 @@
           <a:p>
             <a:fld id="{305DF9F5-3E2B-4E4D-9267-415E2A13194D}" type="datetimeFigureOut">
               <a:rPr lang="pt-BR" smtClean="0"/>
-              <a:t>11/04/2019</a:t>
+              <a:t>13/04/2019</a:t>
             </a:fld>
             <a:endParaRPr lang="pt-BR"/>
           </a:p>
@@ -816,7 +816,7 @@
           <a:p>
             <a:fld id="{305DF9F5-3E2B-4E4D-9267-415E2A13194D}" type="datetimeFigureOut">
               <a:rPr lang="pt-BR" smtClean="0"/>
-              <a:t>11/04/2019</a:t>
+              <a:t>13/04/2019</a:t>
             </a:fld>
             <a:endParaRPr lang="pt-BR"/>
           </a:p>
@@ -1061,7 +1061,7 @@
           <a:p>
             <a:fld id="{305DF9F5-3E2B-4E4D-9267-415E2A13194D}" type="datetimeFigureOut">
               <a:rPr lang="pt-BR" smtClean="0"/>
-              <a:t>11/04/2019</a:t>
+              <a:t>13/04/2019</a:t>
             </a:fld>
             <a:endParaRPr lang="pt-BR"/>
           </a:p>
@@ -1346,7 +1346,7 @@
           <a:p>
             <a:fld id="{305DF9F5-3E2B-4E4D-9267-415E2A13194D}" type="datetimeFigureOut">
               <a:rPr lang="pt-BR" smtClean="0"/>
-              <a:t>11/04/2019</a:t>
+              <a:t>13/04/2019</a:t>
             </a:fld>
             <a:endParaRPr lang="pt-BR"/>
           </a:p>
@@ -1765,7 +1765,7 @@
           <a:p>
             <a:fld id="{305DF9F5-3E2B-4E4D-9267-415E2A13194D}" type="datetimeFigureOut">
               <a:rPr lang="pt-BR" smtClean="0"/>
-              <a:t>11/04/2019</a:t>
+              <a:t>13/04/2019</a:t>
             </a:fld>
             <a:endParaRPr lang="pt-BR"/>
           </a:p>
@@ -1882,7 +1882,7 @@
           <a:p>
             <a:fld id="{305DF9F5-3E2B-4E4D-9267-415E2A13194D}" type="datetimeFigureOut">
               <a:rPr lang="pt-BR" smtClean="0"/>
-              <a:t>11/04/2019</a:t>
+              <a:t>13/04/2019</a:t>
             </a:fld>
             <a:endParaRPr lang="pt-BR"/>
           </a:p>
@@ -1977,7 +1977,7 @@
           <a:p>
             <a:fld id="{305DF9F5-3E2B-4E4D-9267-415E2A13194D}" type="datetimeFigureOut">
               <a:rPr lang="pt-BR" smtClean="0"/>
-              <a:t>11/04/2019</a:t>
+              <a:t>13/04/2019</a:t>
             </a:fld>
             <a:endParaRPr lang="pt-BR"/>
           </a:p>
@@ -2252,7 +2252,7 @@
           <a:p>
             <a:fld id="{305DF9F5-3E2B-4E4D-9267-415E2A13194D}" type="datetimeFigureOut">
               <a:rPr lang="pt-BR" smtClean="0"/>
-              <a:t>11/04/2019</a:t>
+              <a:t>13/04/2019</a:t>
             </a:fld>
             <a:endParaRPr lang="pt-BR"/>
           </a:p>
@@ -2504,7 +2504,7 @@
           <a:p>
             <a:fld id="{305DF9F5-3E2B-4E4D-9267-415E2A13194D}" type="datetimeFigureOut">
               <a:rPr lang="pt-BR" smtClean="0"/>
-              <a:t>11/04/2019</a:t>
+              <a:t>13/04/2019</a:t>
             </a:fld>
             <a:endParaRPr lang="pt-BR"/>
           </a:p>
@@ -2715,7 +2715,7 @@
           <a:p>
             <a:fld id="{305DF9F5-3E2B-4E4D-9267-415E2A13194D}" type="datetimeFigureOut">
               <a:rPr lang="pt-BR" smtClean="0"/>
-              <a:t>11/04/2019</a:t>
+              <a:t>13/04/2019</a:t>
             </a:fld>
             <a:endParaRPr lang="pt-BR"/>
           </a:p>
@@ -3253,7 +3253,7 @@
         </p:nvSpPr>
         <p:spPr>
           <a:xfrm>
-            <a:off x="3080725" y="2823949"/>
+            <a:off x="3080725" y="2837959"/>
             <a:ext cx="5112568" cy="1135013"/>
           </a:xfrm>
           <a:prstGeom prst="rect">
@@ -4405,10 +4405,10 @@
       </p:sp>
       <p:grpSp>
         <p:nvGrpSpPr>
-          <p:cNvPr id="35" name="Grupo 5">
+          <p:cNvPr id="47" name="Agrupar 46">
             <a:extLst>
               <a:ext uri="{FF2B5EF4-FFF2-40B4-BE49-F238E27FC236}">
-                <a16:creationId xmlns:a16="http://schemas.microsoft.com/office/drawing/2014/main" id="{46C33DDD-0B4C-4308-B8AD-79FF7C35A74F}"/>
+                <a16:creationId xmlns:a16="http://schemas.microsoft.com/office/drawing/2014/main" id="{B454CFEA-C91B-4645-8D7C-E961B290A988}"/>
               </a:ext>
             </a:extLst>
           </p:cNvPr>
@@ -4417,7 +4417,728 @@
         </p:nvGrpSpPr>
         <p:grpSpPr>
           <a:xfrm>
-            <a:off x="3358311" y="3661749"/>
+            <a:off x="3795023" y="3241220"/>
+            <a:ext cx="360040" cy="333705"/>
+            <a:chOff x="3851920" y="3260498"/>
+            <a:chExt cx="360040" cy="333705"/>
+          </a:xfrm>
+        </p:grpSpPr>
+        <p:grpSp>
+          <p:nvGrpSpPr>
+            <p:cNvPr id="35" name="Grupo 5">
+              <a:extLst>
+                <a:ext uri="{FF2B5EF4-FFF2-40B4-BE49-F238E27FC236}">
+                  <a16:creationId xmlns:a16="http://schemas.microsoft.com/office/drawing/2014/main" id="{46C33DDD-0B4C-4308-B8AD-79FF7C35A74F}"/>
+                </a:ext>
+              </a:extLst>
+            </p:cNvPr>
+            <p:cNvGrpSpPr/>
+            <p:nvPr/>
+          </p:nvGrpSpPr>
+          <p:grpSpPr>
+            <a:xfrm>
+              <a:off x="3851920" y="3260498"/>
+              <a:ext cx="360040" cy="333705"/>
+              <a:chOff x="1475656" y="1557324"/>
+              <a:chExt cx="2088232" cy="2391964"/>
+            </a:xfrm>
+          </p:grpSpPr>
+          <p:sp>
+            <p:nvSpPr>
+              <p:cNvPr id="37" name="Retângulo de cantos arredondados 4">
+                <a:extLst>
+                  <a:ext uri="{FF2B5EF4-FFF2-40B4-BE49-F238E27FC236}">
+                    <a16:creationId xmlns:a16="http://schemas.microsoft.com/office/drawing/2014/main" id="{AE1DE7D4-F82C-433C-BB22-AC9A2B4B2B88}"/>
+                  </a:ext>
+                </a:extLst>
+              </p:cNvPr>
+              <p:cNvSpPr/>
+              <p:nvPr/>
+            </p:nvSpPr>
+            <p:spPr>
+              <a:xfrm>
+                <a:off x="1475656" y="1861049"/>
+                <a:ext cx="2088232" cy="2088239"/>
+              </a:xfrm>
+              <a:prstGeom prst="roundRect">
+                <a:avLst/>
+              </a:prstGeom>
+              <a:solidFill>
+                <a:srgbClr val="3690A8"/>
+              </a:solidFill>
+              <a:ln>
+                <a:noFill/>
+              </a:ln>
+            </p:spPr>
+            <p:style>
+              <a:lnRef idx="2">
+                <a:schemeClr val="accent1">
+                  <a:shade val="50000"/>
+                </a:schemeClr>
+              </a:lnRef>
+              <a:fillRef idx="1">
+                <a:schemeClr val="accent1"/>
+              </a:fillRef>
+              <a:effectRef idx="0">
+                <a:schemeClr val="accent1"/>
+              </a:effectRef>
+              <a:fontRef idx="minor">
+                <a:schemeClr val="lt1"/>
+              </a:fontRef>
+            </p:style>
+            <p:txBody>
+              <a:bodyPr rtlCol="0" anchor="ctr"/>
+              <a:lstStyle/>
+              <a:p>
+                <a:pPr algn="ctr"/>
+                <a:endParaRPr lang="pt-BR" dirty="0">
+                  <a:ln w="0"/>
+                  <a:solidFill>
+                    <a:schemeClr val="tx1"/>
+                  </a:solidFill>
+                  <a:effectLst>
+                    <a:outerShdw blurRad="38100" dist="19050" dir="2700000" algn="tl" rotWithShape="0">
+                      <a:schemeClr val="dk1">
+                        <a:alpha val="40000"/>
+                      </a:schemeClr>
+                    </a:outerShdw>
+                  </a:effectLst>
+                </a:endParaRPr>
+              </a:p>
+            </p:txBody>
+          </p:sp>
+          <p:sp>
+            <p:nvSpPr>
+              <p:cNvPr id="38" name="Retângulo de cantos arredondados 3">
+                <a:extLst>
+                  <a:ext uri="{FF2B5EF4-FFF2-40B4-BE49-F238E27FC236}">
+                    <a16:creationId xmlns:a16="http://schemas.microsoft.com/office/drawing/2014/main" id="{F7E7A46F-EA57-4962-B4F1-3A180985D5E3}"/>
+                  </a:ext>
+                </a:extLst>
+              </p:cNvPr>
+              <p:cNvSpPr/>
+              <p:nvPr/>
+            </p:nvSpPr>
+            <p:spPr>
+              <a:xfrm>
+                <a:off x="1475656" y="1557324"/>
+                <a:ext cx="2088232" cy="2088232"/>
+              </a:xfrm>
+              <a:prstGeom prst="roundRect">
+                <a:avLst/>
+              </a:prstGeom>
+              <a:solidFill>
+                <a:srgbClr val="4BACC6"/>
+              </a:solidFill>
+              <a:ln>
+                <a:noFill/>
+              </a:ln>
+            </p:spPr>
+            <p:style>
+              <a:lnRef idx="2">
+                <a:schemeClr val="accent1">
+                  <a:shade val="50000"/>
+                </a:schemeClr>
+              </a:lnRef>
+              <a:fillRef idx="1">
+                <a:schemeClr val="accent1"/>
+              </a:fillRef>
+              <a:effectRef idx="0">
+                <a:schemeClr val="accent1"/>
+              </a:effectRef>
+              <a:fontRef idx="minor">
+                <a:schemeClr val="lt1"/>
+              </a:fontRef>
+            </p:style>
+            <p:txBody>
+              <a:bodyPr rtlCol="0" anchor="ctr"/>
+              <a:lstStyle/>
+              <a:p>
+                <a:pPr algn="ctr"/>
+                <a:endParaRPr lang="pt-BR">
+                  <a:ln w="0"/>
+                  <a:solidFill>
+                    <a:schemeClr val="tx1"/>
+                  </a:solidFill>
+                  <a:effectLst>
+                    <a:outerShdw blurRad="38100" dist="19050" dir="2700000" algn="tl" rotWithShape="0">
+                      <a:schemeClr val="dk1">
+                        <a:alpha val="40000"/>
+                      </a:schemeClr>
+                    </a:outerShdw>
+                  </a:effectLst>
+                </a:endParaRPr>
+              </a:p>
+            </p:txBody>
+          </p:sp>
+        </p:grpSp>
+        <p:grpSp>
+          <p:nvGrpSpPr>
+            <p:cNvPr id="45" name="Agrupar 44">
+              <a:extLst>
+                <a:ext uri="{FF2B5EF4-FFF2-40B4-BE49-F238E27FC236}">
+                  <a16:creationId xmlns:a16="http://schemas.microsoft.com/office/drawing/2014/main" id="{921B9819-24F6-4BC0-A672-E03D40AFD479}"/>
+                </a:ext>
+              </a:extLst>
+            </p:cNvPr>
+            <p:cNvGrpSpPr/>
+            <p:nvPr/>
+          </p:nvGrpSpPr>
+          <p:grpSpPr>
+            <a:xfrm>
+              <a:off x="3899341" y="3341663"/>
+              <a:ext cx="234737" cy="150838"/>
+              <a:chOff x="3353365" y="2919760"/>
+              <a:chExt cx="637925" cy="409919"/>
+            </a:xfrm>
+          </p:grpSpPr>
+          <p:grpSp>
+            <p:nvGrpSpPr>
+              <p:cNvPr id="39" name="Agrupar 38">
+                <a:extLst>
+                  <a:ext uri="{FF2B5EF4-FFF2-40B4-BE49-F238E27FC236}">
+                    <a16:creationId xmlns:a16="http://schemas.microsoft.com/office/drawing/2014/main" id="{C5D11EF7-2B6D-438B-8C16-7905E7C7BA79}"/>
+                  </a:ext>
+                </a:extLst>
+              </p:cNvPr>
+              <p:cNvGrpSpPr/>
+              <p:nvPr/>
+            </p:nvGrpSpPr>
+            <p:grpSpPr>
+              <a:xfrm>
+                <a:off x="3353365" y="2919760"/>
+                <a:ext cx="637925" cy="409919"/>
+                <a:chOff x="3860460" y="3304943"/>
+                <a:chExt cx="280376" cy="142610"/>
+              </a:xfrm>
+              <a:solidFill>
+                <a:srgbClr val="3690A8"/>
+              </a:solidFill>
+            </p:grpSpPr>
+            <p:sp>
+              <p:nvSpPr>
+                <p:cNvPr id="2" name="Retângulo 1">
+                  <a:extLst>
+                    <a:ext uri="{FF2B5EF4-FFF2-40B4-BE49-F238E27FC236}">
+                      <a16:creationId xmlns:a16="http://schemas.microsoft.com/office/drawing/2014/main" id="{BCBA27BF-C9CC-4848-8830-A51D9B078BA2}"/>
+                    </a:ext>
+                  </a:extLst>
+                </p:cNvPr>
+                <p:cNvSpPr/>
+                <p:nvPr/>
+              </p:nvSpPr>
+              <p:spPr>
+                <a:xfrm>
+                  <a:off x="3958942" y="3304943"/>
+                  <a:ext cx="181894" cy="142610"/>
+                </a:xfrm>
+                <a:prstGeom prst="rect">
+                  <a:avLst/>
+                </a:prstGeom>
+                <a:grpFill/>
+                <a:ln>
+                  <a:noFill/>
+                </a:ln>
+              </p:spPr>
+              <p:style>
+                <a:lnRef idx="2">
+                  <a:schemeClr val="accent1">
+                    <a:shade val="50000"/>
+                  </a:schemeClr>
+                </a:lnRef>
+                <a:fillRef idx="1">
+                  <a:schemeClr val="accent1"/>
+                </a:fillRef>
+                <a:effectRef idx="0">
+                  <a:schemeClr val="accent1"/>
+                </a:effectRef>
+                <a:fontRef idx="minor">
+                  <a:schemeClr val="lt1"/>
+                </a:fontRef>
+              </p:style>
+              <p:txBody>
+                <a:bodyPr rtlCol="0" anchor="ctr"/>
+                <a:lstStyle/>
+                <a:p>
+                  <a:pPr algn="ctr"/>
+                  <a:endParaRPr lang="pt-BR"/>
+                </a:p>
+              </p:txBody>
+            </p:sp>
+            <p:sp>
+              <p:nvSpPr>
+                <p:cNvPr id="3" name="Triângulo isósceles 2">
+                  <a:extLst>
+                    <a:ext uri="{FF2B5EF4-FFF2-40B4-BE49-F238E27FC236}">
+                      <a16:creationId xmlns:a16="http://schemas.microsoft.com/office/drawing/2014/main" id="{01278A0F-F650-49CC-9C71-A954AF3E3627}"/>
+                    </a:ext>
+                  </a:extLst>
+                </p:cNvPr>
+                <p:cNvSpPr/>
+                <p:nvPr/>
+              </p:nvSpPr>
+              <p:spPr>
+                <a:xfrm rot="16200000">
+                  <a:off x="3838396" y="3327007"/>
+                  <a:ext cx="142610" cy="98482"/>
+                </a:xfrm>
+                <a:prstGeom prst="triangle">
+                  <a:avLst>
+                    <a:gd name="adj" fmla="val 49531"/>
+                  </a:avLst>
+                </a:prstGeom>
+                <a:grpFill/>
+                <a:ln>
+                  <a:noFill/>
+                </a:ln>
+              </p:spPr>
+              <p:style>
+                <a:lnRef idx="2">
+                  <a:schemeClr val="accent1">
+                    <a:shade val="50000"/>
+                  </a:schemeClr>
+                </a:lnRef>
+                <a:fillRef idx="1">
+                  <a:schemeClr val="accent1"/>
+                </a:fillRef>
+                <a:effectRef idx="0">
+                  <a:schemeClr val="accent1"/>
+                </a:effectRef>
+                <a:fontRef idx="minor">
+                  <a:schemeClr val="lt1"/>
+                </a:fontRef>
+              </p:style>
+              <p:txBody>
+                <a:bodyPr rtlCol="0" anchor="ctr"/>
+                <a:lstStyle/>
+                <a:p>
+                  <a:pPr algn="ctr"/>
+                  <a:endParaRPr lang="pt-BR"/>
+                </a:p>
+              </p:txBody>
+            </p:sp>
+          </p:grpSp>
+          <p:grpSp>
+            <p:nvGrpSpPr>
+              <p:cNvPr id="41" name="Agrupar 40">
+                <a:extLst>
+                  <a:ext uri="{FF2B5EF4-FFF2-40B4-BE49-F238E27FC236}">
+                    <a16:creationId xmlns:a16="http://schemas.microsoft.com/office/drawing/2014/main" id="{6487E750-9CD4-4130-A7BD-EBF054BB268D}"/>
+                  </a:ext>
+                </a:extLst>
+              </p:cNvPr>
+              <p:cNvGrpSpPr/>
+              <p:nvPr/>
+            </p:nvGrpSpPr>
+            <p:grpSpPr>
+              <a:xfrm>
+                <a:off x="3554934" y="3074266"/>
+                <a:ext cx="381393" cy="86911"/>
+                <a:chOff x="3510183" y="3101189"/>
+                <a:chExt cx="223247" cy="50873"/>
+              </a:xfrm>
+            </p:grpSpPr>
+            <p:sp>
+              <p:nvSpPr>
+                <p:cNvPr id="40" name="Retângulo: Cantos Arredondados 39">
+                  <a:extLst>
+                    <a:ext uri="{FF2B5EF4-FFF2-40B4-BE49-F238E27FC236}">
+                      <a16:creationId xmlns:a16="http://schemas.microsoft.com/office/drawing/2014/main" id="{B47E0044-725B-4A8D-9CFB-C769D7B19065}"/>
+                    </a:ext>
+                  </a:extLst>
+                </p:cNvPr>
+                <p:cNvSpPr/>
+                <p:nvPr/>
+              </p:nvSpPr>
+              <p:spPr>
+                <a:xfrm rot="2723672">
+                  <a:off x="3598947" y="3012426"/>
+                  <a:ext cx="45719" cy="223246"/>
+                </a:xfrm>
+                <a:prstGeom prst="roundRect">
+                  <a:avLst>
+                    <a:gd name="adj" fmla="val 50000"/>
+                  </a:avLst>
+                </a:prstGeom>
+                <a:solidFill>
+                  <a:schemeClr val="bg1"/>
+                </a:solidFill>
+                <a:ln>
+                  <a:noFill/>
+                </a:ln>
+              </p:spPr>
+              <p:style>
+                <a:lnRef idx="2">
+                  <a:schemeClr val="accent1">
+                    <a:shade val="50000"/>
+                  </a:schemeClr>
+                </a:lnRef>
+                <a:fillRef idx="1">
+                  <a:schemeClr val="accent1"/>
+                </a:fillRef>
+                <a:effectRef idx="0">
+                  <a:schemeClr val="accent1"/>
+                </a:effectRef>
+                <a:fontRef idx="minor">
+                  <a:schemeClr val="lt1"/>
+                </a:fontRef>
+              </p:style>
+              <p:txBody>
+                <a:bodyPr rtlCol="0" anchor="ctr"/>
+                <a:lstStyle/>
+                <a:p>
+                  <a:pPr algn="ctr"/>
+                  <a:endParaRPr lang="pt-BR"/>
+                </a:p>
+              </p:txBody>
+            </p:sp>
+            <p:sp>
+              <p:nvSpPr>
+                <p:cNvPr id="43" name="Retângulo: Cantos Arredondados 42">
+                  <a:extLst>
+                    <a:ext uri="{FF2B5EF4-FFF2-40B4-BE49-F238E27FC236}">
+                      <a16:creationId xmlns:a16="http://schemas.microsoft.com/office/drawing/2014/main" id="{EB4CF4E3-6D90-4B5A-BFD2-BBEC1C6D1D2B}"/>
+                    </a:ext>
+                  </a:extLst>
+                </p:cNvPr>
+                <p:cNvSpPr/>
+                <p:nvPr/>
+              </p:nvSpPr>
+              <p:spPr>
+                <a:xfrm rot="18748851" flipV="1">
+                  <a:off x="3598946" y="3017580"/>
+                  <a:ext cx="45719" cy="223246"/>
+                </a:xfrm>
+                <a:prstGeom prst="roundRect">
+                  <a:avLst>
+                    <a:gd name="adj" fmla="val 50000"/>
+                  </a:avLst>
+                </a:prstGeom>
+                <a:solidFill>
+                  <a:schemeClr val="bg1"/>
+                </a:solidFill>
+                <a:ln>
+                  <a:noFill/>
+                </a:ln>
+              </p:spPr>
+              <p:style>
+                <a:lnRef idx="2">
+                  <a:schemeClr val="accent1">
+                    <a:shade val="50000"/>
+                  </a:schemeClr>
+                </a:lnRef>
+                <a:fillRef idx="1">
+                  <a:schemeClr val="accent1"/>
+                </a:fillRef>
+                <a:effectRef idx="0">
+                  <a:schemeClr val="accent1"/>
+                </a:effectRef>
+                <a:fontRef idx="minor">
+                  <a:schemeClr val="lt1"/>
+                </a:fontRef>
+              </p:style>
+              <p:txBody>
+                <a:bodyPr rtlCol="0" anchor="ctr"/>
+                <a:lstStyle/>
+                <a:p>
+                  <a:pPr algn="ctr"/>
+                  <a:endParaRPr lang="pt-BR"/>
+                </a:p>
+              </p:txBody>
+            </p:sp>
+          </p:grpSp>
+        </p:grpSp>
+      </p:grpSp>
+      <p:grpSp>
+        <p:nvGrpSpPr>
+          <p:cNvPr id="55" name="Agrupar 54">
+            <a:extLst>
+              <a:ext uri="{FF2B5EF4-FFF2-40B4-BE49-F238E27FC236}">
+                <a16:creationId xmlns:a16="http://schemas.microsoft.com/office/drawing/2014/main" id="{CC999F4B-E85E-4AEA-B45E-AD36C88FBEE2}"/>
+              </a:ext>
+            </a:extLst>
+          </p:cNvPr>
+          <p:cNvGrpSpPr/>
+          <p:nvPr/>
+        </p:nvGrpSpPr>
+        <p:grpSpPr>
+          <a:xfrm>
+            <a:off x="3358311" y="3626395"/>
+            <a:ext cx="360040" cy="333704"/>
+            <a:chOff x="3358311" y="3626395"/>
+            <a:chExt cx="360040" cy="333704"/>
+          </a:xfrm>
+        </p:grpSpPr>
+        <p:grpSp>
+          <p:nvGrpSpPr>
+            <p:cNvPr id="49" name="Grupo 5">
+              <a:extLst>
+                <a:ext uri="{FF2B5EF4-FFF2-40B4-BE49-F238E27FC236}">
+                  <a16:creationId xmlns:a16="http://schemas.microsoft.com/office/drawing/2014/main" id="{99FAE24C-9A47-419B-B5E5-D4D808CA5418}"/>
+                </a:ext>
+              </a:extLst>
+            </p:cNvPr>
+            <p:cNvGrpSpPr/>
+            <p:nvPr/>
+          </p:nvGrpSpPr>
+          <p:grpSpPr>
+            <a:xfrm>
+              <a:off x="3358311" y="3626395"/>
+              <a:ext cx="360040" cy="333704"/>
+              <a:chOff x="1475656" y="1557324"/>
+              <a:chExt cx="2088232" cy="2391958"/>
+            </a:xfrm>
+          </p:grpSpPr>
+          <p:sp>
+            <p:nvSpPr>
+              <p:cNvPr id="50" name="Retângulo de cantos arredondados 4">
+                <a:extLst>
+                  <a:ext uri="{FF2B5EF4-FFF2-40B4-BE49-F238E27FC236}">
+                    <a16:creationId xmlns:a16="http://schemas.microsoft.com/office/drawing/2014/main" id="{70B9A222-8692-41C6-A567-6CF1F7554F5C}"/>
+                  </a:ext>
+                </a:extLst>
+              </p:cNvPr>
+              <p:cNvSpPr/>
+              <p:nvPr/>
+            </p:nvSpPr>
+            <p:spPr>
+              <a:xfrm>
+                <a:off x="1475656" y="1861053"/>
+                <a:ext cx="2088232" cy="2088229"/>
+              </a:xfrm>
+              <a:prstGeom prst="roundRect">
+                <a:avLst/>
+              </a:prstGeom>
+              <a:solidFill>
+                <a:srgbClr val="4B4B4B"/>
+              </a:solidFill>
+              <a:ln>
+                <a:noFill/>
+              </a:ln>
+            </p:spPr>
+            <p:style>
+              <a:lnRef idx="2">
+                <a:schemeClr val="accent1">
+                  <a:shade val="50000"/>
+                </a:schemeClr>
+              </a:lnRef>
+              <a:fillRef idx="1">
+                <a:schemeClr val="accent1"/>
+              </a:fillRef>
+              <a:effectRef idx="0">
+                <a:schemeClr val="accent1"/>
+              </a:effectRef>
+              <a:fontRef idx="minor">
+                <a:schemeClr val="lt1"/>
+              </a:fontRef>
+            </p:style>
+            <p:txBody>
+              <a:bodyPr rtlCol="0" anchor="ctr"/>
+              <a:lstStyle/>
+              <a:p>
+                <a:pPr algn="ctr"/>
+                <a:endParaRPr lang="pt-BR"/>
+              </a:p>
+            </p:txBody>
+          </p:sp>
+          <p:sp>
+            <p:nvSpPr>
+              <p:cNvPr id="51" name="Retângulo de cantos arredondados 3">
+                <a:extLst>
+                  <a:ext uri="{FF2B5EF4-FFF2-40B4-BE49-F238E27FC236}">
+                    <a16:creationId xmlns:a16="http://schemas.microsoft.com/office/drawing/2014/main" id="{4A451C11-9122-415F-8310-23BDA0CCEB9F}"/>
+                  </a:ext>
+                </a:extLst>
+              </p:cNvPr>
+              <p:cNvSpPr/>
+              <p:nvPr/>
+            </p:nvSpPr>
+            <p:spPr>
+              <a:xfrm>
+                <a:off x="1475656" y="1557324"/>
+                <a:ext cx="2088232" cy="2088232"/>
+              </a:xfrm>
+              <a:prstGeom prst="roundRect">
+                <a:avLst/>
+              </a:prstGeom>
+              <a:solidFill>
+                <a:srgbClr val="595959"/>
+              </a:solidFill>
+              <a:ln>
+                <a:noFill/>
+              </a:ln>
+            </p:spPr>
+            <p:style>
+              <a:lnRef idx="2">
+                <a:schemeClr val="accent1">
+                  <a:shade val="50000"/>
+                </a:schemeClr>
+              </a:lnRef>
+              <a:fillRef idx="1">
+                <a:schemeClr val="accent1"/>
+              </a:fillRef>
+              <a:effectRef idx="0">
+                <a:schemeClr val="accent1"/>
+              </a:effectRef>
+              <a:fontRef idx="minor">
+                <a:schemeClr val="lt1"/>
+              </a:fontRef>
+            </p:style>
+            <p:txBody>
+              <a:bodyPr rtlCol="0" anchor="ctr"/>
+              <a:lstStyle/>
+              <a:p>
+                <a:pPr algn="ctr"/>
+                <a:endParaRPr lang="pt-BR"/>
+              </a:p>
+            </p:txBody>
+          </p:sp>
+        </p:grpSp>
+        <p:grpSp>
+          <p:nvGrpSpPr>
+            <p:cNvPr id="48" name="Agrupar 47">
+              <a:extLst>
+                <a:ext uri="{FF2B5EF4-FFF2-40B4-BE49-F238E27FC236}">
+                  <a16:creationId xmlns:a16="http://schemas.microsoft.com/office/drawing/2014/main" id="{01E6FE0D-EF5E-4B81-8E69-CCE4DF60E417}"/>
+                </a:ext>
+              </a:extLst>
+            </p:cNvPr>
+            <p:cNvGrpSpPr/>
+            <p:nvPr/>
+          </p:nvGrpSpPr>
+          <p:grpSpPr>
+            <a:xfrm>
+              <a:off x="3468160" y="3757003"/>
+              <a:ext cx="140341" cy="31981"/>
+              <a:chOff x="3484334" y="3775636"/>
+              <a:chExt cx="140341" cy="31981"/>
+            </a:xfrm>
+          </p:grpSpPr>
+          <p:sp>
+            <p:nvSpPr>
+              <p:cNvPr id="52" name="Retângulo: Cantos Arredondados 51">
+                <a:extLst>
+                  <a:ext uri="{FF2B5EF4-FFF2-40B4-BE49-F238E27FC236}">
+                    <a16:creationId xmlns:a16="http://schemas.microsoft.com/office/drawing/2014/main" id="{5DFCB4A5-DEBD-45F9-9DF1-047740DB4031}"/>
+                  </a:ext>
+                </a:extLst>
+              </p:cNvPr>
+              <p:cNvSpPr/>
+              <p:nvPr/>
+            </p:nvSpPr>
+            <p:spPr>
+              <a:xfrm rot="2723672">
+                <a:off x="3540134" y="3719837"/>
+                <a:ext cx="28741" cy="140340"/>
+              </a:xfrm>
+              <a:prstGeom prst="roundRect">
+                <a:avLst>
+                  <a:gd name="adj" fmla="val 50000"/>
+                </a:avLst>
+              </a:prstGeom>
+              <a:solidFill>
+                <a:schemeClr val="bg1"/>
+              </a:solidFill>
+              <a:ln>
+                <a:noFill/>
+              </a:ln>
+            </p:spPr>
+            <p:style>
+              <a:lnRef idx="2">
+                <a:schemeClr val="accent1">
+                  <a:shade val="50000"/>
+                </a:schemeClr>
+              </a:lnRef>
+              <a:fillRef idx="1">
+                <a:schemeClr val="accent1"/>
+              </a:fillRef>
+              <a:effectRef idx="0">
+                <a:schemeClr val="accent1"/>
+              </a:effectRef>
+              <a:fontRef idx="minor">
+                <a:schemeClr val="lt1"/>
+              </a:fontRef>
+            </p:style>
+            <p:txBody>
+              <a:bodyPr rtlCol="0" anchor="ctr"/>
+              <a:lstStyle/>
+              <a:p>
+                <a:pPr algn="ctr"/>
+                <a:endParaRPr lang="pt-BR"/>
+              </a:p>
+            </p:txBody>
+          </p:sp>
+          <p:sp>
+            <p:nvSpPr>
+              <p:cNvPr id="53" name="Retângulo: Cantos Arredondados 52">
+                <a:extLst>
+                  <a:ext uri="{FF2B5EF4-FFF2-40B4-BE49-F238E27FC236}">
+                    <a16:creationId xmlns:a16="http://schemas.microsoft.com/office/drawing/2014/main" id="{FA7BB6B9-EF2A-4DAF-9EDF-E6A071F57AF4}"/>
+                  </a:ext>
+                </a:extLst>
+              </p:cNvPr>
+              <p:cNvSpPr/>
+              <p:nvPr/>
+            </p:nvSpPr>
+            <p:spPr>
+              <a:xfrm rot="18748851" flipV="1">
+                <a:off x="3540133" y="3723077"/>
+                <a:ext cx="28741" cy="140340"/>
+              </a:xfrm>
+              <a:prstGeom prst="roundRect">
+                <a:avLst>
+                  <a:gd name="adj" fmla="val 50000"/>
+                </a:avLst>
+              </a:prstGeom>
+              <a:solidFill>
+                <a:schemeClr val="bg1"/>
+              </a:solidFill>
+              <a:ln>
+                <a:noFill/>
+              </a:ln>
+            </p:spPr>
+            <p:style>
+              <a:lnRef idx="2">
+                <a:schemeClr val="accent1">
+                  <a:shade val="50000"/>
+                </a:schemeClr>
+              </a:lnRef>
+              <a:fillRef idx="1">
+                <a:schemeClr val="accent1"/>
+              </a:fillRef>
+              <a:effectRef idx="0">
+                <a:schemeClr val="accent1"/>
+              </a:effectRef>
+              <a:fontRef idx="minor">
+                <a:schemeClr val="lt1"/>
+              </a:fontRef>
+            </p:style>
+            <p:txBody>
+              <a:bodyPr rtlCol="0" anchor="ctr"/>
+              <a:lstStyle/>
+              <a:p>
+                <a:pPr algn="ctr"/>
+                <a:endParaRPr lang="pt-BR"/>
+              </a:p>
+            </p:txBody>
+          </p:sp>
+        </p:grpSp>
+      </p:grpSp>
+      <p:grpSp>
+        <p:nvGrpSpPr>
+          <p:cNvPr id="58" name="Grupo 5">
+            <a:extLst>
+              <a:ext uri="{FF2B5EF4-FFF2-40B4-BE49-F238E27FC236}">
+                <a16:creationId xmlns:a16="http://schemas.microsoft.com/office/drawing/2014/main" id="{7D002B77-70EE-4473-BB68-F794F4D52831}"/>
+              </a:ext>
+            </a:extLst>
+          </p:cNvPr>
+          <p:cNvGrpSpPr/>
+          <p:nvPr/>
+        </p:nvGrpSpPr>
+        <p:grpSpPr>
+          <a:xfrm>
+            <a:off x="3806764" y="3619436"/>
             <a:ext cx="360040" cy="333704"/>
             <a:chOff x="1475656" y="1557324"/>
             <a:chExt cx="2088232" cy="2391958"/>
@@ -4425,10 +5146,10 @@
         </p:grpSpPr>
         <p:sp>
           <p:nvSpPr>
-            <p:cNvPr id="37" name="Retângulo de cantos arredondados 4">
+            <p:cNvPr id="62" name="Retângulo de cantos arredondados 4">
               <a:extLst>
                 <a:ext uri="{FF2B5EF4-FFF2-40B4-BE49-F238E27FC236}">
-                  <a16:creationId xmlns:a16="http://schemas.microsoft.com/office/drawing/2014/main" id="{AE1DE7D4-F82C-433C-BB22-AC9A2B4B2B88}"/>
+                  <a16:creationId xmlns:a16="http://schemas.microsoft.com/office/drawing/2014/main" id="{65331E93-0DE6-4054-AF21-2468BC3BB699}"/>
                 </a:ext>
               </a:extLst>
             </p:cNvPr>
@@ -4471,16 +5192,16 @@
             <a:lstStyle/>
             <a:p>
               <a:pPr algn="ctr"/>
-              <a:endParaRPr lang="pt-BR" dirty="0"/>
+              <a:endParaRPr lang="pt-BR"/>
             </a:p>
           </p:txBody>
         </p:sp>
         <p:sp>
           <p:nvSpPr>
-            <p:cNvPr id="38" name="Retângulo de cantos arredondados 3">
+            <p:cNvPr id="63" name="Retângulo de cantos arredondados 3">
               <a:extLst>
                 <a:ext uri="{FF2B5EF4-FFF2-40B4-BE49-F238E27FC236}">
-                  <a16:creationId xmlns:a16="http://schemas.microsoft.com/office/drawing/2014/main" id="{F7E7A46F-EA57-4962-B4F1-3A180985D5E3}"/>
+                  <a16:creationId xmlns:a16="http://schemas.microsoft.com/office/drawing/2014/main" id="{C13A9B07-2392-4559-8955-F0429C0E18EE}"/>
                 </a:ext>
               </a:extLst>
             </p:cNvPr>
@@ -4527,6 +5248,1208 @@
             </a:p>
           </p:txBody>
         </p:sp>
+      </p:grpSp>
+      <p:grpSp>
+        <p:nvGrpSpPr>
+          <p:cNvPr id="56" name="Agrupar 55">
+            <a:extLst>
+              <a:ext uri="{FF2B5EF4-FFF2-40B4-BE49-F238E27FC236}">
+                <a16:creationId xmlns:a16="http://schemas.microsoft.com/office/drawing/2014/main" id="{C6F4B90A-76E0-43AB-A334-677C42D1EF82}"/>
+              </a:ext>
+            </a:extLst>
+          </p:cNvPr>
+          <p:cNvGrpSpPr/>
+          <p:nvPr/>
+        </p:nvGrpSpPr>
+        <p:grpSpPr>
+          <a:xfrm>
+            <a:off x="3925794" y="3701890"/>
+            <a:ext cx="140340" cy="140340"/>
+            <a:chOff x="3925766" y="3698309"/>
+            <a:chExt cx="140340" cy="140340"/>
+          </a:xfrm>
+        </p:grpSpPr>
+        <p:sp>
+          <p:nvSpPr>
+            <p:cNvPr id="60" name="Retângulo: Cantos Arredondados 59">
+              <a:extLst>
+                <a:ext uri="{FF2B5EF4-FFF2-40B4-BE49-F238E27FC236}">
+                  <a16:creationId xmlns:a16="http://schemas.microsoft.com/office/drawing/2014/main" id="{30230895-0946-4CCB-9F63-F3F450AE3BE0}"/>
+                </a:ext>
+              </a:extLst>
+            </p:cNvPr>
+            <p:cNvSpPr/>
+            <p:nvPr/>
+          </p:nvSpPr>
+          <p:spPr>
+            <a:xfrm rot="5423672">
+              <a:off x="3981565" y="3698087"/>
+              <a:ext cx="28741" cy="140340"/>
+            </a:xfrm>
+            <a:prstGeom prst="roundRect">
+              <a:avLst>
+                <a:gd name="adj" fmla="val 50000"/>
+              </a:avLst>
+            </a:prstGeom>
+            <a:solidFill>
+              <a:schemeClr val="bg1"/>
+            </a:solidFill>
+            <a:ln>
+              <a:noFill/>
+            </a:ln>
+          </p:spPr>
+          <p:style>
+            <a:lnRef idx="2">
+              <a:schemeClr val="accent1">
+                <a:shade val="50000"/>
+              </a:schemeClr>
+            </a:lnRef>
+            <a:fillRef idx="1">
+              <a:schemeClr val="accent1"/>
+            </a:fillRef>
+            <a:effectRef idx="0">
+              <a:schemeClr val="accent1"/>
+            </a:effectRef>
+            <a:fontRef idx="minor">
+              <a:schemeClr val="lt1"/>
+            </a:fontRef>
+          </p:style>
+          <p:txBody>
+            <a:bodyPr rtlCol="0" anchor="ctr"/>
+            <a:lstStyle/>
+            <a:p>
+              <a:pPr algn="ctr"/>
+              <a:endParaRPr lang="pt-BR"/>
+            </a:p>
+          </p:txBody>
+        </p:sp>
+        <p:sp>
+          <p:nvSpPr>
+            <p:cNvPr id="64" name="Retângulo: Cantos Arredondados 63">
+              <a:extLst>
+                <a:ext uri="{FF2B5EF4-FFF2-40B4-BE49-F238E27FC236}">
+                  <a16:creationId xmlns:a16="http://schemas.microsoft.com/office/drawing/2014/main" id="{63BBC6D7-0996-4AEC-A041-A0A8820713DF}"/>
+                </a:ext>
+              </a:extLst>
+            </p:cNvPr>
+            <p:cNvSpPr/>
+            <p:nvPr/>
+          </p:nvSpPr>
+          <p:spPr>
+            <a:xfrm rot="23672">
+              <a:off x="3977688" y="3698309"/>
+              <a:ext cx="28741" cy="140340"/>
+            </a:xfrm>
+            <a:prstGeom prst="roundRect">
+              <a:avLst>
+                <a:gd name="adj" fmla="val 50000"/>
+              </a:avLst>
+            </a:prstGeom>
+            <a:solidFill>
+              <a:schemeClr val="bg1"/>
+            </a:solidFill>
+            <a:ln>
+              <a:noFill/>
+            </a:ln>
+          </p:spPr>
+          <p:style>
+            <a:lnRef idx="2">
+              <a:schemeClr val="accent1">
+                <a:shade val="50000"/>
+              </a:schemeClr>
+            </a:lnRef>
+            <a:fillRef idx="1">
+              <a:schemeClr val="accent1"/>
+            </a:fillRef>
+            <a:effectRef idx="0">
+              <a:schemeClr val="accent1"/>
+            </a:effectRef>
+            <a:fontRef idx="minor">
+              <a:schemeClr val="lt1"/>
+            </a:fontRef>
+          </p:style>
+          <p:txBody>
+            <a:bodyPr rtlCol="0" anchor="ctr"/>
+            <a:lstStyle/>
+            <a:p>
+              <a:pPr algn="ctr"/>
+              <a:endParaRPr lang="pt-BR"/>
+            </a:p>
+          </p:txBody>
+        </p:sp>
+      </p:grpSp>
+      <p:grpSp>
+        <p:nvGrpSpPr>
+          <p:cNvPr id="69" name="Agrupar 68">
+            <a:extLst>
+              <a:ext uri="{FF2B5EF4-FFF2-40B4-BE49-F238E27FC236}">
+                <a16:creationId xmlns:a16="http://schemas.microsoft.com/office/drawing/2014/main" id="{B9297464-F285-47B5-AD99-2272741F0331}"/>
+              </a:ext>
+            </a:extLst>
+          </p:cNvPr>
+          <p:cNvGrpSpPr/>
+          <p:nvPr/>
+        </p:nvGrpSpPr>
+        <p:grpSpPr>
+          <a:xfrm>
+            <a:off x="3358311" y="4017574"/>
+            <a:ext cx="360040" cy="333704"/>
+            <a:chOff x="3358311" y="4017574"/>
+            <a:chExt cx="360040" cy="333704"/>
+          </a:xfrm>
+        </p:grpSpPr>
+        <p:grpSp>
+          <p:nvGrpSpPr>
+            <p:cNvPr id="66" name="Grupo 5">
+              <a:extLst>
+                <a:ext uri="{FF2B5EF4-FFF2-40B4-BE49-F238E27FC236}">
+                  <a16:creationId xmlns:a16="http://schemas.microsoft.com/office/drawing/2014/main" id="{9C076C78-C551-4EAE-BEF8-98359C47A9C9}"/>
+                </a:ext>
+              </a:extLst>
+            </p:cNvPr>
+            <p:cNvGrpSpPr/>
+            <p:nvPr/>
+          </p:nvGrpSpPr>
+          <p:grpSpPr>
+            <a:xfrm>
+              <a:off x="3358311" y="4017574"/>
+              <a:ext cx="360040" cy="333704"/>
+              <a:chOff x="1475656" y="1557324"/>
+              <a:chExt cx="2088232" cy="2391958"/>
+            </a:xfrm>
+          </p:grpSpPr>
+          <p:sp>
+            <p:nvSpPr>
+              <p:cNvPr id="67" name="Retângulo de cantos arredondados 4">
+                <a:extLst>
+                  <a:ext uri="{FF2B5EF4-FFF2-40B4-BE49-F238E27FC236}">
+                    <a16:creationId xmlns:a16="http://schemas.microsoft.com/office/drawing/2014/main" id="{7D6D2002-712C-4155-AD49-D59432320B29}"/>
+                  </a:ext>
+                </a:extLst>
+              </p:cNvPr>
+              <p:cNvSpPr/>
+              <p:nvPr/>
+            </p:nvSpPr>
+            <p:spPr>
+              <a:xfrm>
+                <a:off x="1475656" y="1861053"/>
+                <a:ext cx="2088232" cy="2088229"/>
+              </a:xfrm>
+              <a:prstGeom prst="roundRect">
+                <a:avLst/>
+              </a:prstGeom>
+              <a:solidFill>
+                <a:srgbClr val="4B4B4B"/>
+              </a:solidFill>
+              <a:ln>
+                <a:noFill/>
+              </a:ln>
+            </p:spPr>
+            <p:style>
+              <a:lnRef idx="2">
+                <a:schemeClr val="accent1">
+                  <a:shade val="50000"/>
+                </a:schemeClr>
+              </a:lnRef>
+              <a:fillRef idx="1">
+                <a:schemeClr val="accent1"/>
+              </a:fillRef>
+              <a:effectRef idx="0">
+                <a:schemeClr val="accent1"/>
+              </a:effectRef>
+              <a:fontRef idx="minor">
+                <a:schemeClr val="lt1"/>
+              </a:fontRef>
+            </p:style>
+            <p:txBody>
+              <a:bodyPr rtlCol="0" anchor="ctr"/>
+              <a:lstStyle/>
+              <a:p>
+                <a:pPr algn="ctr"/>
+                <a:endParaRPr lang="pt-BR"/>
+              </a:p>
+            </p:txBody>
+          </p:sp>
+          <p:sp>
+            <p:nvSpPr>
+              <p:cNvPr id="68" name="Retângulo de cantos arredondados 3">
+                <a:extLst>
+                  <a:ext uri="{FF2B5EF4-FFF2-40B4-BE49-F238E27FC236}">
+                    <a16:creationId xmlns:a16="http://schemas.microsoft.com/office/drawing/2014/main" id="{91E414C2-E632-4A7B-BFD1-5BECB4DFA6F1}"/>
+                  </a:ext>
+                </a:extLst>
+              </p:cNvPr>
+              <p:cNvSpPr/>
+              <p:nvPr/>
+            </p:nvSpPr>
+            <p:spPr>
+              <a:xfrm>
+                <a:off x="1475656" y="1557324"/>
+                <a:ext cx="2088232" cy="2088232"/>
+              </a:xfrm>
+              <a:prstGeom prst="roundRect">
+                <a:avLst/>
+              </a:prstGeom>
+              <a:solidFill>
+                <a:srgbClr val="595959"/>
+              </a:solidFill>
+              <a:ln>
+                <a:noFill/>
+              </a:ln>
+            </p:spPr>
+            <p:style>
+              <a:lnRef idx="2">
+                <a:schemeClr val="accent1">
+                  <a:shade val="50000"/>
+                </a:schemeClr>
+              </a:lnRef>
+              <a:fillRef idx="1">
+                <a:schemeClr val="accent1"/>
+              </a:fillRef>
+              <a:effectRef idx="0">
+                <a:schemeClr val="accent1"/>
+              </a:effectRef>
+              <a:fontRef idx="minor">
+                <a:schemeClr val="lt1"/>
+              </a:fontRef>
+            </p:style>
+            <p:txBody>
+              <a:bodyPr rtlCol="0" anchor="ctr"/>
+              <a:lstStyle/>
+              <a:p>
+                <a:pPr algn="ctr"/>
+                <a:endParaRPr lang="pt-BR"/>
+              </a:p>
+            </p:txBody>
+          </p:sp>
+        </p:grpSp>
+        <p:sp>
+          <p:nvSpPr>
+            <p:cNvPr id="65" name="Elipse 64">
+              <a:extLst>
+                <a:ext uri="{FF2B5EF4-FFF2-40B4-BE49-F238E27FC236}">
+                  <a16:creationId xmlns:a16="http://schemas.microsoft.com/office/drawing/2014/main" id="{E7C3CB91-AE61-4E55-8A27-17432F982FF7}"/>
+                </a:ext>
+              </a:extLst>
+            </p:cNvPr>
+            <p:cNvSpPr/>
+            <p:nvPr/>
+          </p:nvSpPr>
+          <p:spPr>
+            <a:xfrm flipH="1">
+              <a:off x="3513450" y="4197325"/>
+              <a:ext cx="49758" cy="49758"/>
+            </a:xfrm>
+            <a:prstGeom prst="ellipse">
+              <a:avLst/>
+            </a:prstGeom>
+            <a:solidFill>
+              <a:schemeClr val="bg1"/>
+            </a:solidFill>
+            <a:ln>
+              <a:noFill/>
+            </a:ln>
+          </p:spPr>
+          <p:style>
+            <a:lnRef idx="2">
+              <a:schemeClr val="accent1">
+                <a:shade val="50000"/>
+              </a:schemeClr>
+            </a:lnRef>
+            <a:fillRef idx="1">
+              <a:schemeClr val="accent1"/>
+            </a:fillRef>
+            <a:effectRef idx="0">
+              <a:schemeClr val="accent1"/>
+            </a:effectRef>
+            <a:fontRef idx="minor">
+              <a:schemeClr val="lt1"/>
+            </a:fontRef>
+          </p:style>
+          <p:txBody>
+            <a:bodyPr rtlCol="0" anchor="ctr"/>
+            <a:lstStyle/>
+            <a:p>
+              <a:pPr algn="ctr"/>
+              <a:endParaRPr lang="pt-BR" dirty="0"/>
+            </a:p>
+          </p:txBody>
+        </p:sp>
+      </p:grpSp>
+      <p:grpSp>
+        <p:nvGrpSpPr>
+          <p:cNvPr id="70" name="Agrupar 69">
+            <a:extLst>
+              <a:ext uri="{FF2B5EF4-FFF2-40B4-BE49-F238E27FC236}">
+                <a16:creationId xmlns:a16="http://schemas.microsoft.com/office/drawing/2014/main" id="{8CC59306-40BE-4E0B-9553-AFE6EF449EB4}"/>
+              </a:ext>
+            </a:extLst>
+          </p:cNvPr>
+          <p:cNvGrpSpPr/>
+          <p:nvPr/>
+        </p:nvGrpSpPr>
+        <p:grpSpPr>
+          <a:xfrm>
+            <a:off x="3812633" y="4030473"/>
+            <a:ext cx="360040" cy="333704"/>
+            <a:chOff x="3812633" y="4030473"/>
+            <a:chExt cx="360040" cy="333704"/>
+          </a:xfrm>
+        </p:grpSpPr>
+        <p:grpSp>
+          <p:nvGrpSpPr>
+            <p:cNvPr id="72" name="Grupo 5">
+              <a:extLst>
+                <a:ext uri="{FF2B5EF4-FFF2-40B4-BE49-F238E27FC236}">
+                  <a16:creationId xmlns:a16="http://schemas.microsoft.com/office/drawing/2014/main" id="{B9390DF4-C03D-4748-9EF0-5B8DAD2C456E}"/>
+                </a:ext>
+              </a:extLst>
+            </p:cNvPr>
+            <p:cNvGrpSpPr/>
+            <p:nvPr/>
+          </p:nvGrpSpPr>
+          <p:grpSpPr>
+            <a:xfrm>
+              <a:off x="3812633" y="4030473"/>
+              <a:ext cx="360040" cy="333704"/>
+              <a:chOff x="1475656" y="1557324"/>
+              <a:chExt cx="2088232" cy="2391958"/>
+            </a:xfrm>
+          </p:grpSpPr>
+          <p:sp>
+            <p:nvSpPr>
+              <p:cNvPr id="74" name="Retângulo de cantos arredondados 4">
+                <a:extLst>
+                  <a:ext uri="{FF2B5EF4-FFF2-40B4-BE49-F238E27FC236}">
+                    <a16:creationId xmlns:a16="http://schemas.microsoft.com/office/drawing/2014/main" id="{50B1A16C-79D9-40E3-9B83-CF42B3B3553D}"/>
+                  </a:ext>
+                </a:extLst>
+              </p:cNvPr>
+              <p:cNvSpPr/>
+              <p:nvPr/>
+            </p:nvSpPr>
+            <p:spPr>
+              <a:xfrm>
+                <a:off x="1475656" y="1861053"/>
+                <a:ext cx="2088232" cy="2088229"/>
+              </a:xfrm>
+              <a:prstGeom prst="roundRect">
+                <a:avLst/>
+              </a:prstGeom>
+              <a:solidFill>
+                <a:srgbClr val="4B4B4B"/>
+              </a:solidFill>
+              <a:ln>
+                <a:noFill/>
+              </a:ln>
+            </p:spPr>
+            <p:style>
+              <a:lnRef idx="2">
+                <a:schemeClr val="accent1">
+                  <a:shade val="50000"/>
+                </a:schemeClr>
+              </a:lnRef>
+              <a:fillRef idx="1">
+                <a:schemeClr val="accent1"/>
+              </a:fillRef>
+              <a:effectRef idx="0">
+                <a:schemeClr val="accent1"/>
+              </a:effectRef>
+              <a:fontRef idx="minor">
+                <a:schemeClr val="lt1"/>
+              </a:fontRef>
+            </p:style>
+            <p:txBody>
+              <a:bodyPr rtlCol="0" anchor="ctr"/>
+              <a:lstStyle/>
+              <a:p>
+                <a:pPr algn="ctr"/>
+                <a:endParaRPr lang="pt-BR"/>
+              </a:p>
+            </p:txBody>
+          </p:sp>
+          <p:sp>
+            <p:nvSpPr>
+              <p:cNvPr id="75" name="Retângulo de cantos arredondados 3">
+                <a:extLst>
+                  <a:ext uri="{FF2B5EF4-FFF2-40B4-BE49-F238E27FC236}">
+                    <a16:creationId xmlns:a16="http://schemas.microsoft.com/office/drawing/2014/main" id="{A867D93C-71CF-489E-B492-F457CB8DB2E9}"/>
+                  </a:ext>
+                </a:extLst>
+              </p:cNvPr>
+              <p:cNvSpPr/>
+              <p:nvPr/>
+            </p:nvSpPr>
+            <p:spPr>
+              <a:xfrm>
+                <a:off x="1475656" y="1557324"/>
+                <a:ext cx="2088232" cy="2088232"/>
+              </a:xfrm>
+              <a:prstGeom prst="roundRect">
+                <a:avLst/>
+              </a:prstGeom>
+              <a:solidFill>
+                <a:srgbClr val="595959"/>
+              </a:solidFill>
+              <a:ln>
+                <a:noFill/>
+              </a:ln>
+            </p:spPr>
+            <p:style>
+              <a:lnRef idx="2">
+                <a:schemeClr val="accent1">
+                  <a:shade val="50000"/>
+                </a:schemeClr>
+              </a:lnRef>
+              <a:fillRef idx="1">
+                <a:schemeClr val="accent1"/>
+              </a:fillRef>
+              <a:effectRef idx="0">
+                <a:schemeClr val="accent1"/>
+              </a:effectRef>
+              <a:fontRef idx="minor">
+                <a:schemeClr val="lt1"/>
+              </a:fontRef>
+            </p:style>
+            <p:txBody>
+              <a:bodyPr rtlCol="0" anchor="ctr"/>
+              <a:lstStyle/>
+              <a:p>
+                <a:pPr algn="ctr"/>
+                <a:endParaRPr lang="pt-BR"/>
+              </a:p>
+            </p:txBody>
+          </p:sp>
+        </p:grpSp>
+        <p:sp>
+          <p:nvSpPr>
+            <p:cNvPr id="77" name="Retângulo: Cantos Arredondados 76">
+              <a:extLst>
+                <a:ext uri="{FF2B5EF4-FFF2-40B4-BE49-F238E27FC236}">
+                  <a16:creationId xmlns:a16="http://schemas.microsoft.com/office/drawing/2014/main" id="{579EE6B5-9F8F-42A2-81E7-6F11DD9E1F01}"/>
+                </a:ext>
+              </a:extLst>
+            </p:cNvPr>
+            <p:cNvSpPr/>
+            <p:nvPr/>
+          </p:nvSpPr>
+          <p:spPr>
+            <a:xfrm rot="5423672">
+              <a:off x="3981593" y="4123167"/>
+              <a:ext cx="28741" cy="140340"/>
+            </a:xfrm>
+            <a:prstGeom prst="roundRect">
+              <a:avLst>
+                <a:gd name="adj" fmla="val 50000"/>
+              </a:avLst>
+            </a:prstGeom>
+            <a:solidFill>
+              <a:schemeClr val="bg1"/>
+            </a:solidFill>
+            <a:ln>
+              <a:noFill/>
+            </a:ln>
+          </p:spPr>
+          <p:style>
+            <a:lnRef idx="2">
+              <a:schemeClr val="accent1">
+                <a:shade val="50000"/>
+              </a:schemeClr>
+            </a:lnRef>
+            <a:fillRef idx="1">
+              <a:schemeClr val="accent1"/>
+            </a:fillRef>
+            <a:effectRef idx="0">
+              <a:schemeClr val="accent1"/>
+            </a:effectRef>
+            <a:fontRef idx="minor">
+              <a:schemeClr val="lt1"/>
+            </a:fontRef>
+          </p:style>
+          <p:txBody>
+            <a:bodyPr rtlCol="0" anchor="ctr"/>
+            <a:lstStyle/>
+            <a:p>
+              <a:pPr algn="ctr"/>
+              <a:endParaRPr lang="pt-BR" dirty="0"/>
+            </a:p>
+          </p:txBody>
+        </p:sp>
+      </p:grpSp>
+      <p:grpSp>
+        <p:nvGrpSpPr>
+          <p:cNvPr id="94" name="Agrupar 93">
+            <a:extLst>
+              <a:ext uri="{FF2B5EF4-FFF2-40B4-BE49-F238E27FC236}">
+                <a16:creationId xmlns:a16="http://schemas.microsoft.com/office/drawing/2014/main" id="{8D2375F7-E009-4263-A5E6-641D1E016033}"/>
+              </a:ext>
+            </a:extLst>
+          </p:cNvPr>
+          <p:cNvGrpSpPr/>
+          <p:nvPr/>
+        </p:nvGrpSpPr>
+        <p:grpSpPr>
+          <a:xfrm>
+            <a:off x="3367135" y="4422712"/>
+            <a:ext cx="360040" cy="333704"/>
+            <a:chOff x="3367135" y="4422712"/>
+            <a:chExt cx="360040" cy="333704"/>
+          </a:xfrm>
+        </p:grpSpPr>
+        <p:grpSp>
+          <p:nvGrpSpPr>
+            <p:cNvPr id="80" name="Grupo 5">
+              <a:extLst>
+                <a:ext uri="{FF2B5EF4-FFF2-40B4-BE49-F238E27FC236}">
+                  <a16:creationId xmlns:a16="http://schemas.microsoft.com/office/drawing/2014/main" id="{6AE50179-0E37-4D1C-B372-1FDAF63B500C}"/>
+                </a:ext>
+              </a:extLst>
+            </p:cNvPr>
+            <p:cNvGrpSpPr/>
+            <p:nvPr/>
+          </p:nvGrpSpPr>
+          <p:grpSpPr>
+            <a:xfrm>
+              <a:off x="3367135" y="4422712"/>
+              <a:ext cx="360040" cy="333704"/>
+              <a:chOff x="1475656" y="1557324"/>
+              <a:chExt cx="2088232" cy="2391958"/>
+            </a:xfrm>
+          </p:grpSpPr>
+          <p:sp>
+            <p:nvSpPr>
+              <p:cNvPr id="82" name="Retângulo de cantos arredondados 4">
+                <a:extLst>
+                  <a:ext uri="{FF2B5EF4-FFF2-40B4-BE49-F238E27FC236}">
+                    <a16:creationId xmlns:a16="http://schemas.microsoft.com/office/drawing/2014/main" id="{B67DC444-FB10-4306-8305-60597E9DE30A}"/>
+                  </a:ext>
+                </a:extLst>
+              </p:cNvPr>
+              <p:cNvSpPr/>
+              <p:nvPr/>
+            </p:nvSpPr>
+            <p:spPr>
+              <a:xfrm>
+                <a:off x="1475656" y="1861053"/>
+                <a:ext cx="2088232" cy="2088229"/>
+              </a:xfrm>
+              <a:prstGeom prst="roundRect">
+                <a:avLst/>
+              </a:prstGeom>
+              <a:solidFill>
+                <a:srgbClr val="4B4B4B"/>
+              </a:solidFill>
+              <a:ln>
+                <a:noFill/>
+              </a:ln>
+            </p:spPr>
+            <p:style>
+              <a:lnRef idx="2">
+                <a:schemeClr val="accent1">
+                  <a:shade val="50000"/>
+                </a:schemeClr>
+              </a:lnRef>
+              <a:fillRef idx="1">
+                <a:schemeClr val="accent1"/>
+              </a:fillRef>
+              <a:effectRef idx="0">
+                <a:schemeClr val="accent1"/>
+              </a:effectRef>
+              <a:fontRef idx="minor">
+                <a:schemeClr val="lt1"/>
+              </a:fontRef>
+            </p:style>
+            <p:txBody>
+              <a:bodyPr rtlCol="0" anchor="ctr"/>
+              <a:lstStyle/>
+              <a:p>
+                <a:pPr algn="ctr"/>
+                <a:endParaRPr lang="pt-BR"/>
+              </a:p>
+            </p:txBody>
+          </p:sp>
+          <p:sp>
+            <p:nvSpPr>
+              <p:cNvPr id="83" name="Retângulo de cantos arredondados 3">
+                <a:extLst>
+                  <a:ext uri="{FF2B5EF4-FFF2-40B4-BE49-F238E27FC236}">
+                    <a16:creationId xmlns:a16="http://schemas.microsoft.com/office/drawing/2014/main" id="{F5A06FD6-A110-4E8E-BA4A-320907088840}"/>
+                  </a:ext>
+                </a:extLst>
+              </p:cNvPr>
+              <p:cNvSpPr/>
+              <p:nvPr/>
+            </p:nvSpPr>
+            <p:spPr>
+              <a:xfrm>
+                <a:off x="1475656" y="1557324"/>
+                <a:ext cx="2088232" cy="2088232"/>
+              </a:xfrm>
+              <a:prstGeom prst="roundRect">
+                <a:avLst/>
+              </a:prstGeom>
+              <a:solidFill>
+                <a:srgbClr val="595959"/>
+              </a:solidFill>
+              <a:ln>
+                <a:noFill/>
+              </a:ln>
+            </p:spPr>
+            <p:style>
+              <a:lnRef idx="2">
+                <a:schemeClr val="accent1">
+                  <a:shade val="50000"/>
+                </a:schemeClr>
+              </a:lnRef>
+              <a:fillRef idx="1">
+                <a:schemeClr val="accent1"/>
+              </a:fillRef>
+              <a:effectRef idx="0">
+                <a:schemeClr val="accent1"/>
+              </a:effectRef>
+              <a:fontRef idx="minor">
+                <a:schemeClr val="lt1"/>
+              </a:fontRef>
+            </p:style>
+            <p:txBody>
+              <a:bodyPr rtlCol="0" anchor="ctr"/>
+              <a:lstStyle/>
+              <a:p>
+                <a:pPr algn="ctr"/>
+                <a:endParaRPr lang="pt-BR"/>
+              </a:p>
+            </p:txBody>
+          </p:sp>
+        </p:grpSp>
+        <p:grpSp>
+          <p:nvGrpSpPr>
+            <p:cNvPr id="93" name="Agrupar 92">
+              <a:extLst>
+                <a:ext uri="{FF2B5EF4-FFF2-40B4-BE49-F238E27FC236}">
+                  <a16:creationId xmlns:a16="http://schemas.microsoft.com/office/drawing/2014/main" id="{E34A69FF-1F7B-4694-A8F7-3B7B60C202E4}"/>
+                </a:ext>
+              </a:extLst>
+            </p:cNvPr>
+            <p:cNvGrpSpPr/>
+            <p:nvPr/>
+          </p:nvGrpSpPr>
+          <p:grpSpPr>
+            <a:xfrm>
+              <a:off x="3476971" y="4516057"/>
+              <a:ext cx="140340" cy="137028"/>
+              <a:chOff x="3476971" y="4516057"/>
+              <a:chExt cx="140340" cy="137028"/>
+            </a:xfrm>
+          </p:grpSpPr>
+          <p:sp>
+            <p:nvSpPr>
+              <p:cNvPr id="89" name="Elipse 88">
+                <a:extLst>
+                  <a:ext uri="{FF2B5EF4-FFF2-40B4-BE49-F238E27FC236}">
+                    <a16:creationId xmlns:a16="http://schemas.microsoft.com/office/drawing/2014/main" id="{F3E16FC3-C9E1-4EAD-BD23-7518F656366C}"/>
+                  </a:ext>
+                </a:extLst>
+              </p:cNvPr>
+              <p:cNvSpPr/>
+              <p:nvPr/>
+            </p:nvSpPr>
+            <p:spPr>
+              <a:xfrm flipH="1">
+                <a:off x="3527888" y="4516057"/>
+                <a:ext cx="36000" cy="36000"/>
+              </a:xfrm>
+              <a:prstGeom prst="ellipse">
+                <a:avLst/>
+              </a:prstGeom>
+              <a:solidFill>
+                <a:schemeClr val="bg1"/>
+              </a:solidFill>
+              <a:ln>
+                <a:noFill/>
+              </a:ln>
+            </p:spPr>
+            <p:style>
+              <a:lnRef idx="2">
+                <a:schemeClr val="accent1">
+                  <a:shade val="50000"/>
+                </a:schemeClr>
+              </a:lnRef>
+              <a:fillRef idx="1">
+                <a:schemeClr val="accent1"/>
+              </a:fillRef>
+              <a:effectRef idx="0">
+                <a:schemeClr val="accent1"/>
+              </a:effectRef>
+              <a:fontRef idx="minor">
+                <a:schemeClr val="lt1"/>
+              </a:fontRef>
+            </p:style>
+            <p:txBody>
+              <a:bodyPr rtlCol="0" anchor="ctr"/>
+              <a:lstStyle/>
+              <a:p>
+                <a:pPr algn="ctr"/>
+                <a:endParaRPr lang="pt-BR" dirty="0"/>
+              </a:p>
+            </p:txBody>
+          </p:sp>
+          <p:grpSp>
+            <p:nvGrpSpPr>
+              <p:cNvPr id="78" name="Agrupar 77">
+                <a:extLst>
+                  <a:ext uri="{FF2B5EF4-FFF2-40B4-BE49-F238E27FC236}">
+                    <a16:creationId xmlns:a16="http://schemas.microsoft.com/office/drawing/2014/main" id="{139201A2-B41B-459E-962C-EAA888D61B18}"/>
+                  </a:ext>
+                </a:extLst>
+              </p:cNvPr>
+              <p:cNvGrpSpPr/>
+              <p:nvPr/>
+            </p:nvGrpSpPr>
+            <p:grpSpPr>
+              <a:xfrm>
+                <a:off x="3476971" y="4570257"/>
+                <a:ext cx="140340" cy="82828"/>
+                <a:chOff x="3476971" y="4570257"/>
+                <a:chExt cx="140340" cy="82828"/>
+              </a:xfrm>
+            </p:grpSpPr>
+            <p:sp>
+              <p:nvSpPr>
+                <p:cNvPr id="91" name="Retângulo: Cantos Arredondados 90">
+                  <a:extLst>
+                    <a:ext uri="{FF2B5EF4-FFF2-40B4-BE49-F238E27FC236}">
+                      <a16:creationId xmlns:a16="http://schemas.microsoft.com/office/drawing/2014/main" id="{4184B59F-05B1-4611-9024-BCBC89881708}"/>
+                    </a:ext>
+                  </a:extLst>
+                </p:cNvPr>
+                <p:cNvSpPr/>
+                <p:nvPr/>
+              </p:nvSpPr>
+              <p:spPr>
+                <a:xfrm rot="5423672">
+                  <a:off x="3532770" y="4514458"/>
+                  <a:ext cx="28741" cy="140340"/>
+                </a:xfrm>
+                <a:prstGeom prst="roundRect">
+                  <a:avLst>
+                    <a:gd name="adj" fmla="val 50000"/>
+                  </a:avLst>
+                </a:prstGeom>
+                <a:solidFill>
+                  <a:schemeClr val="bg1"/>
+                </a:solidFill>
+                <a:ln>
+                  <a:noFill/>
+                </a:ln>
+              </p:spPr>
+              <p:style>
+                <a:lnRef idx="2">
+                  <a:schemeClr val="accent1">
+                    <a:shade val="50000"/>
+                  </a:schemeClr>
+                </a:lnRef>
+                <a:fillRef idx="1">
+                  <a:schemeClr val="accent1"/>
+                </a:fillRef>
+                <a:effectRef idx="0">
+                  <a:schemeClr val="accent1"/>
+                </a:effectRef>
+                <a:fontRef idx="minor">
+                  <a:schemeClr val="lt1"/>
+                </a:fontRef>
+              </p:style>
+              <p:txBody>
+                <a:bodyPr rtlCol="0" anchor="ctr"/>
+                <a:lstStyle/>
+                <a:p>
+                  <a:pPr algn="ctr"/>
+                  <a:endParaRPr lang="pt-BR" dirty="0"/>
+                </a:p>
+              </p:txBody>
+            </p:sp>
+            <p:sp>
+              <p:nvSpPr>
+                <p:cNvPr id="92" name="Elipse 91">
+                  <a:extLst>
+                    <a:ext uri="{FF2B5EF4-FFF2-40B4-BE49-F238E27FC236}">
+                      <a16:creationId xmlns:a16="http://schemas.microsoft.com/office/drawing/2014/main" id="{661A3906-3547-44A8-9CCD-CD80B357AC45}"/>
+                    </a:ext>
+                  </a:extLst>
+                </p:cNvPr>
+                <p:cNvSpPr/>
+                <p:nvPr/>
+              </p:nvSpPr>
+              <p:spPr>
+                <a:xfrm flipH="1">
+                  <a:off x="3527888" y="4617085"/>
+                  <a:ext cx="36000" cy="36000"/>
+                </a:xfrm>
+                <a:prstGeom prst="ellipse">
+                  <a:avLst/>
+                </a:prstGeom>
+                <a:solidFill>
+                  <a:schemeClr val="bg1"/>
+                </a:solidFill>
+                <a:ln>
+                  <a:noFill/>
+                </a:ln>
+              </p:spPr>
+              <p:style>
+                <a:lnRef idx="2">
+                  <a:schemeClr val="accent1">
+                    <a:shade val="50000"/>
+                  </a:schemeClr>
+                </a:lnRef>
+                <a:fillRef idx="1">
+                  <a:schemeClr val="accent1"/>
+                </a:fillRef>
+                <a:effectRef idx="0">
+                  <a:schemeClr val="accent1"/>
+                </a:effectRef>
+                <a:fontRef idx="minor">
+                  <a:schemeClr val="lt1"/>
+                </a:fontRef>
+              </p:style>
+              <p:txBody>
+                <a:bodyPr rtlCol="0" anchor="ctr"/>
+                <a:lstStyle/>
+                <a:p>
+                  <a:pPr algn="ctr"/>
+                  <a:endParaRPr lang="pt-BR" dirty="0"/>
+                </a:p>
+              </p:txBody>
+            </p:sp>
+          </p:grpSp>
+        </p:grpSp>
+      </p:grpSp>
+      <p:grpSp>
+        <p:nvGrpSpPr>
+          <p:cNvPr id="108" name="Agrupar 107">
+            <a:extLst>
+              <a:ext uri="{FF2B5EF4-FFF2-40B4-BE49-F238E27FC236}">
+                <a16:creationId xmlns:a16="http://schemas.microsoft.com/office/drawing/2014/main" id="{C6B88D39-5910-460D-9315-35F91DD0D906}"/>
+              </a:ext>
+            </a:extLst>
+          </p:cNvPr>
+          <p:cNvGrpSpPr/>
+          <p:nvPr/>
+        </p:nvGrpSpPr>
+        <p:grpSpPr>
+          <a:xfrm>
+            <a:off x="3821018" y="4422712"/>
+            <a:ext cx="360040" cy="333704"/>
+            <a:chOff x="3821018" y="4422712"/>
+            <a:chExt cx="360040" cy="333704"/>
+          </a:xfrm>
+        </p:grpSpPr>
+        <p:grpSp>
+          <p:nvGrpSpPr>
+            <p:cNvPr id="97" name="Grupo 5">
+              <a:extLst>
+                <a:ext uri="{FF2B5EF4-FFF2-40B4-BE49-F238E27FC236}">
+                  <a16:creationId xmlns:a16="http://schemas.microsoft.com/office/drawing/2014/main" id="{6A60F903-6D54-41A1-8365-6C2ED805D97D}"/>
+                </a:ext>
+              </a:extLst>
+            </p:cNvPr>
+            <p:cNvGrpSpPr/>
+            <p:nvPr/>
+          </p:nvGrpSpPr>
+          <p:grpSpPr>
+            <a:xfrm>
+              <a:off x="3821018" y="4422712"/>
+              <a:ext cx="360040" cy="333704"/>
+              <a:chOff x="1475656" y="1557324"/>
+              <a:chExt cx="2088232" cy="2391958"/>
+            </a:xfrm>
+          </p:grpSpPr>
+          <p:sp>
+            <p:nvSpPr>
+              <p:cNvPr id="103" name="Retângulo de cantos arredondados 4">
+                <a:extLst>
+                  <a:ext uri="{FF2B5EF4-FFF2-40B4-BE49-F238E27FC236}">
+                    <a16:creationId xmlns:a16="http://schemas.microsoft.com/office/drawing/2014/main" id="{17808EF1-A609-4488-A0A6-10F425359517}"/>
+                  </a:ext>
+                </a:extLst>
+              </p:cNvPr>
+              <p:cNvSpPr/>
+              <p:nvPr/>
+            </p:nvSpPr>
+            <p:spPr>
+              <a:xfrm>
+                <a:off x="1475656" y="1861053"/>
+                <a:ext cx="2088232" cy="2088229"/>
+              </a:xfrm>
+              <a:prstGeom prst="roundRect">
+                <a:avLst/>
+              </a:prstGeom>
+              <a:solidFill>
+                <a:srgbClr val="4B4B4B"/>
+              </a:solidFill>
+              <a:ln>
+                <a:noFill/>
+              </a:ln>
+            </p:spPr>
+            <p:style>
+              <a:lnRef idx="2">
+                <a:schemeClr val="accent1">
+                  <a:shade val="50000"/>
+                </a:schemeClr>
+              </a:lnRef>
+              <a:fillRef idx="1">
+                <a:schemeClr val="accent1"/>
+              </a:fillRef>
+              <a:effectRef idx="0">
+                <a:schemeClr val="accent1"/>
+              </a:effectRef>
+              <a:fontRef idx="minor">
+                <a:schemeClr val="lt1"/>
+              </a:fontRef>
+            </p:style>
+            <p:txBody>
+              <a:bodyPr rtlCol="0" anchor="ctr"/>
+              <a:lstStyle/>
+              <a:p>
+                <a:pPr algn="ctr"/>
+                <a:endParaRPr lang="pt-BR"/>
+              </a:p>
+            </p:txBody>
+          </p:sp>
+          <p:sp>
+            <p:nvSpPr>
+              <p:cNvPr id="104" name="Retângulo de cantos arredondados 3">
+                <a:extLst>
+                  <a:ext uri="{FF2B5EF4-FFF2-40B4-BE49-F238E27FC236}">
+                    <a16:creationId xmlns:a16="http://schemas.microsoft.com/office/drawing/2014/main" id="{3B10CE38-6B0E-4F77-ACF4-5A864CB07A65}"/>
+                  </a:ext>
+                </a:extLst>
+              </p:cNvPr>
+              <p:cNvSpPr/>
+              <p:nvPr/>
+            </p:nvSpPr>
+            <p:spPr>
+              <a:xfrm>
+                <a:off x="1475656" y="1557324"/>
+                <a:ext cx="2088232" cy="2088232"/>
+              </a:xfrm>
+              <a:prstGeom prst="roundRect">
+                <a:avLst/>
+              </a:prstGeom>
+              <a:solidFill>
+                <a:srgbClr val="595959"/>
+              </a:solidFill>
+              <a:ln>
+                <a:noFill/>
+              </a:ln>
+            </p:spPr>
+            <p:style>
+              <a:lnRef idx="2">
+                <a:schemeClr val="accent1">
+                  <a:shade val="50000"/>
+                </a:schemeClr>
+              </a:lnRef>
+              <a:fillRef idx="1">
+                <a:schemeClr val="accent1"/>
+              </a:fillRef>
+              <a:effectRef idx="0">
+                <a:schemeClr val="accent1"/>
+              </a:effectRef>
+              <a:fontRef idx="minor">
+                <a:schemeClr val="lt1"/>
+              </a:fontRef>
+            </p:style>
+            <p:txBody>
+              <a:bodyPr rtlCol="0" anchor="ctr"/>
+              <a:lstStyle/>
+              <a:p>
+                <a:pPr algn="ctr"/>
+                <a:endParaRPr lang="pt-BR"/>
+              </a:p>
+            </p:txBody>
+          </p:sp>
+        </p:grpSp>
+        <p:grpSp>
+          <p:nvGrpSpPr>
+            <p:cNvPr id="95" name="Agrupar 94">
+              <a:extLst>
+                <a:ext uri="{FF2B5EF4-FFF2-40B4-BE49-F238E27FC236}">
+                  <a16:creationId xmlns:a16="http://schemas.microsoft.com/office/drawing/2014/main" id="{A9D88936-C0CF-4488-86BB-47EB6BF85630}"/>
+                </a:ext>
+              </a:extLst>
+            </p:cNvPr>
+            <p:cNvGrpSpPr/>
+            <p:nvPr/>
+          </p:nvGrpSpPr>
+          <p:grpSpPr>
+            <a:xfrm>
+              <a:off x="3945867" y="4524204"/>
+              <a:ext cx="138679" cy="120110"/>
+              <a:chOff x="3927163" y="4511416"/>
+              <a:chExt cx="164796" cy="142730"/>
+            </a:xfrm>
+          </p:grpSpPr>
+          <p:sp>
+            <p:nvSpPr>
+              <p:cNvPr id="101" name="Retângulo: Cantos Arredondados 100">
+                <a:extLst>
+                  <a:ext uri="{FF2B5EF4-FFF2-40B4-BE49-F238E27FC236}">
+                    <a16:creationId xmlns:a16="http://schemas.microsoft.com/office/drawing/2014/main" id="{84114832-712D-40D0-BD76-AAC8D45740AA}"/>
+                  </a:ext>
+                </a:extLst>
+              </p:cNvPr>
+              <p:cNvSpPr/>
+              <p:nvPr/>
+            </p:nvSpPr>
+            <p:spPr>
+              <a:xfrm rot="11700000" flipV="1">
+                <a:off x="3964439" y="4511416"/>
+                <a:ext cx="28741" cy="140340"/>
+              </a:xfrm>
+              <a:prstGeom prst="roundRect">
+                <a:avLst>
+                  <a:gd name="adj" fmla="val 50000"/>
+                </a:avLst>
+              </a:prstGeom>
+              <a:solidFill>
+                <a:schemeClr val="bg1"/>
+              </a:solidFill>
+              <a:ln>
+                <a:noFill/>
+              </a:ln>
+            </p:spPr>
+            <p:style>
+              <a:lnRef idx="2">
+                <a:schemeClr val="accent1">
+                  <a:shade val="50000"/>
+                </a:schemeClr>
+              </a:lnRef>
+              <a:fillRef idx="1">
+                <a:schemeClr val="accent1"/>
+              </a:fillRef>
+              <a:effectRef idx="0">
+                <a:schemeClr val="accent1"/>
+              </a:effectRef>
+              <a:fontRef idx="minor">
+                <a:schemeClr val="lt1"/>
+              </a:fontRef>
+            </p:style>
+            <p:txBody>
+              <a:bodyPr rtlCol="0" anchor="ctr"/>
+              <a:lstStyle/>
+              <a:p>
+                <a:pPr algn="ctr"/>
+                <a:endParaRPr lang="pt-BR" dirty="0"/>
+              </a:p>
+            </p:txBody>
+          </p:sp>
+          <p:sp>
+            <p:nvSpPr>
+              <p:cNvPr id="105" name="Retângulo: Cantos Arredondados 104">
+                <a:extLst>
+                  <a:ext uri="{FF2B5EF4-FFF2-40B4-BE49-F238E27FC236}">
+                    <a16:creationId xmlns:a16="http://schemas.microsoft.com/office/drawing/2014/main" id="{278BBF47-0C33-4457-9720-AD3EA9243EDC}"/>
+                  </a:ext>
+                </a:extLst>
+              </p:cNvPr>
+              <p:cNvSpPr/>
+              <p:nvPr/>
+            </p:nvSpPr>
+            <p:spPr>
+              <a:xfrm rot="19800000">
+                <a:off x="3927163" y="4546146"/>
+                <a:ext cx="28800" cy="108000"/>
+              </a:xfrm>
+              <a:prstGeom prst="roundRect">
+                <a:avLst>
+                  <a:gd name="adj" fmla="val 50000"/>
+                </a:avLst>
+              </a:prstGeom>
+              <a:solidFill>
+                <a:schemeClr val="bg1"/>
+              </a:solidFill>
+              <a:ln>
+                <a:noFill/>
+              </a:ln>
+            </p:spPr>
+            <p:style>
+              <a:lnRef idx="2">
+                <a:schemeClr val="accent1">
+                  <a:shade val="50000"/>
+                </a:schemeClr>
+              </a:lnRef>
+              <a:fillRef idx="1">
+                <a:schemeClr val="accent1"/>
+              </a:fillRef>
+              <a:effectRef idx="0">
+                <a:schemeClr val="accent1"/>
+              </a:effectRef>
+              <a:fontRef idx="minor">
+                <a:schemeClr val="lt1"/>
+              </a:fontRef>
+            </p:style>
+            <p:txBody>
+              <a:bodyPr rtlCol="0" anchor="ctr"/>
+              <a:lstStyle/>
+              <a:p>
+                <a:pPr algn="ctr"/>
+                <a:endParaRPr lang="pt-BR" dirty="0"/>
+              </a:p>
+            </p:txBody>
+          </p:sp>
+          <p:sp>
+            <p:nvSpPr>
+              <p:cNvPr id="106" name="Retângulo: Cantos Arredondados 105">
+                <a:extLst>
+                  <a:ext uri="{FF2B5EF4-FFF2-40B4-BE49-F238E27FC236}">
+                    <a16:creationId xmlns:a16="http://schemas.microsoft.com/office/drawing/2014/main" id="{E631551F-9ED4-4277-ABE8-B94188B05695}"/>
+                  </a:ext>
+                </a:extLst>
+              </p:cNvPr>
+              <p:cNvSpPr/>
+              <p:nvPr/>
+            </p:nvSpPr>
+            <p:spPr>
+              <a:xfrm rot="16200000">
+                <a:off x="4023559" y="4472668"/>
+                <a:ext cx="28800" cy="108000"/>
+              </a:xfrm>
+              <a:prstGeom prst="roundRect">
+                <a:avLst>
+                  <a:gd name="adj" fmla="val 50000"/>
+                </a:avLst>
+              </a:prstGeom>
+              <a:solidFill>
+                <a:schemeClr val="bg1"/>
+              </a:solidFill>
+              <a:ln>
+                <a:noFill/>
+              </a:ln>
+            </p:spPr>
+            <p:style>
+              <a:lnRef idx="2">
+                <a:schemeClr val="accent1">
+                  <a:shade val="50000"/>
+                </a:schemeClr>
+              </a:lnRef>
+              <a:fillRef idx="1">
+                <a:schemeClr val="accent1"/>
+              </a:fillRef>
+              <a:effectRef idx="0">
+                <a:schemeClr val="accent1"/>
+              </a:effectRef>
+              <a:fontRef idx="minor">
+                <a:schemeClr val="lt1"/>
+              </a:fontRef>
+            </p:style>
+            <p:txBody>
+              <a:bodyPr rtlCol="0" anchor="ctr"/>
+              <a:lstStyle/>
+              <a:p>
+                <a:pPr algn="ctr"/>
+                <a:endParaRPr lang="pt-BR" dirty="0"/>
+              </a:p>
+            </p:txBody>
+          </p:sp>
+        </p:grpSp>
       </p:grpSp>
     </p:spTree>
     <p:extLst>

</xml_diff>

<commit_message>
c o m i t a o
</commit_message>
<xml_diff>
--- a/modelo.pptx
+++ b/modelo.pptx
@@ -106,7 +106,7 @@
   </p:defaultTextStyle>
   <p:extLst>
     <p:ext uri="{EFAFB233-063F-42B5-8137-9DF3F51BA10A}">
-      <p15:sldGuideLst xmlns:p15="http://schemas.microsoft.com/office/powerpoint/2012/main">
+      <p15:sldGuideLst xmlns:p15="http://schemas.microsoft.com/office/powerpoint/2012/main" xmlns="">
         <p15:guide id="1" orient="horz" pos="2160">
           <p15:clr>
             <a:srgbClr val="A4A3A4"/>
@@ -302,7 +302,7 @@
           <a:p>
             <a:fld id="{305DF9F5-3E2B-4E4D-9267-415E2A13194D}" type="datetimeFigureOut">
               <a:rPr lang="pt-BR" smtClean="0"/>
-              <a:t>13/04/2019</a:t>
+              <a:t>15/04/2019</a:t>
             </a:fld>
             <a:endParaRPr lang="pt-BR"/>
           </a:p>
@@ -470,7 +470,7 @@
           <a:p>
             <a:fld id="{305DF9F5-3E2B-4E4D-9267-415E2A13194D}" type="datetimeFigureOut">
               <a:rPr lang="pt-BR" smtClean="0"/>
-              <a:t>13/04/2019</a:t>
+              <a:t>15/04/2019</a:t>
             </a:fld>
             <a:endParaRPr lang="pt-BR"/>
           </a:p>
@@ -648,7 +648,7 @@
           <a:p>
             <a:fld id="{305DF9F5-3E2B-4E4D-9267-415E2A13194D}" type="datetimeFigureOut">
               <a:rPr lang="pt-BR" smtClean="0"/>
-              <a:t>13/04/2019</a:t>
+              <a:t>15/04/2019</a:t>
             </a:fld>
             <a:endParaRPr lang="pt-BR"/>
           </a:p>
@@ -816,7 +816,7 @@
           <a:p>
             <a:fld id="{305DF9F5-3E2B-4E4D-9267-415E2A13194D}" type="datetimeFigureOut">
               <a:rPr lang="pt-BR" smtClean="0"/>
-              <a:t>13/04/2019</a:t>
+              <a:t>15/04/2019</a:t>
             </a:fld>
             <a:endParaRPr lang="pt-BR"/>
           </a:p>
@@ -1061,7 +1061,7 @@
           <a:p>
             <a:fld id="{305DF9F5-3E2B-4E4D-9267-415E2A13194D}" type="datetimeFigureOut">
               <a:rPr lang="pt-BR" smtClean="0"/>
-              <a:t>13/04/2019</a:t>
+              <a:t>15/04/2019</a:t>
             </a:fld>
             <a:endParaRPr lang="pt-BR"/>
           </a:p>
@@ -1346,7 +1346,7 @@
           <a:p>
             <a:fld id="{305DF9F5-3E2B-4E4D-9267-415E2A13194D}" type="datetimeFigureOut">
               <a:rPr lang="pt-BR" smtClean="0"/>
-              <a:t>13/04/2019</a:t>
+              <a:t>15/04/2019</a:t>
             </a:fld>
             <a:endParaRPr lang="pt-BR"/>
           </a:p>
@@ -1765,7 +1765,7 @@
           <a:p>
             <a:fld id="{305DF9F5-3E2B-4E4D-9267-415E2A13194D}" type="datetimeFigureOut">
               <a:rPr lang="pt-BR" smtClean="0"/>
-              <a:t>13/04/2019</a:t>
+              <a:t>15/04/2019</a:t>
             </a:fld>
             <a:endParaRPr lang="pt-BR"/>
           </a:p>
@@ -1882,7 +1882,7 @@
           <a:p>
             <a:fld id="{305DF9F5-3E2B-4E4D-9267-415E2A13194D}" type="datetimeFigureOut">
               <a:rPr lang="pt-BR" smtClean="0"/>
-              <a:t>13/04/2019</a:t>
+              <a:t>15/04/2019</a:t>
             </a:fld>
             <a:endParaRPr lang="pt-BR"/>
           </a:p>
@@ -1977,7 +1977,7 @@
           <a:p>
             <a:fld id="{305DF9F5-3E2B-4E4D-9267-415E2A13194D}" type="datetimeFigureOut">
               <a:rPr lang="pt-BR" smtClean="0"/>
-              <a:t>13/04/2019</a:t>
+              <a:t>15/04/2019</a:t>
             </a:fld>
             <a:endParaRPr lang="pt-BR"/>
           </a:p>
@@ -2252,7 +2252,7 @@
           <a:p>
             <a:fld id="{305DF9F5-3E2B-4E4D-9267-415E2A13194D}" type="datetimeFigureOut">
               <a:rPr lang="pt-BR" smtClean="0"/>
-              <a:t>13/04/2019</a:t>
+              <a:t>15/04/2019</a:t>
             </a:fld>
             <a:endParaRPr lang="pt-BR"/>
           </a:p>
@@ -2504,7 +2504,7 @@
           <a:p>
             <a:fld id="{305DF9F5-3E2B-4E4D-9267-415E2A13194D}" type="datetimeFigureOut">
               <a:rPr lang="pt-BR" smtClean="0"/>
-              <a:t>13/04/2019</a:t>
+              <a:t>15/04/2019</a:t>
             </a:fld>
             <a:endParaRPr lang="pt-BR"/>
           </a:p>
@@ -2715,7 +2715,7 @@
           <a:p>
             <a:fld id="{305DF9F5-3E2B-4E4D-9267-415E2A13194D}" type="datetimeFigureOut">
               <a:rPr lang="pt-BR" smtClean="0"/>
-              <a:t>13/04/2019</a:t>
+              <a:t>15/04/2019</a:t>
             </a:fld>
             <a:endParaRPr lang="pt-BR"/>
           </a:p>
@@ -4408,7 +4408,7 @@
           <p:cNvPr id="47" name="Agrupar 46">
             <a:extLst>
               <a:ext uri="{FF2B5EF4-FFF2-40B4-BE49-F238E27FC236}">
-                <a16:creationId xmlns:a16="http://schemas.microsoft.com/office/drawing/2014/main" id="{B454CFEA-C91B-4645-8D7C-E961B290A988}"/>
+                <a16:creationId xmlns:a16="http://schemas.microsoft.com/office/drawing/2014/main" xmlns="" id="{B454CFEA-C91B-4645-8D7C-E961B290A988}"/>
               </a:ext>
             </a:extLst>
           </p:cNvPr>
@@ -4428,7 +4428,7 @@
             <p:cNvPr id="35" name="Grupo 5">
               <a:extLst>
                 <a:ext uri="{FF2B5EF4-FFF2-40B4-BE49-F238E27FC236}">
-                  <a16:creationId xmlns:a16="http://schemas.microsoft.com/office/drawing/2014/main" id="{46C33DDD-0B4C-4308-B8AD-79FF7C35A74F}"/>
+                  <a16:creationId xmlns:a16="http://schemas.microsoft.com/office/drawing/2014/main" xmlns="" id="{46C33DDD-0B4C-4308-B8AD-79FF7C35A74F}"/>
                 </a:ext>
               </a:extLst>
             </p:cNvPr>
@@ -4448,7 +4448,7 @@
               <p:cNvPr id="37" name="Retângulo de cantos arredondados 4">
                 <a:extLst>
                   <a:ext uri="{FF2B5EF4-FFF2-40B4-BE49-F238E27FC236}">
-                    <a16:creationId xmlns:a16="http://schemas.microsoft.com/office/drawing/2014/main" id="{AE1DE7D4-F82C-433C-BB22-AC9A2B4B2B88}"/>
+                    <a16:creationId xmlns:a16="http://schemas.microsoft.com/office/drawing/2014/main" xmlns="" id="{AE1DE7D4-F82C-433C-BB22-AC9A2B4B2B88}"/>
                   </a:ext>
                 </a:extLst>
               </p:cNvPr>
@@ -4512,7 +4512,7 @@
               <p:cNvPr id="38" name="Retângulo de cantos arredondados 3">
                 <a:extLst>
                   <a:ext uri="{FF2B5EF4-FFF2-40B4-BE49-F238E27FC236}">
-                    <a16:creationId xmlns:a16="http://schemas.microsoft.com/office/drawing/2014/main" id="{F7E7A46F-EA57-4962-B4F1-3A180985D5E3}"/>
+                    <a16:creationId xmlns:a16="http://schemas.microsoft.com/office/drawing/2014/main" xmlns="" id="{F7E7A46F-EA57-4962-B4F1-3A180985D5E3}"/>
                   </a:ext>
                 </a:extLst>
               </p:cNvPr>
@@ -4577,7 +4577,7 @@
             <p:cNvPr id="45" name="Agrupar 44">
               <a:extLst>
                 <a:ext uri="{FF2B5EF4-FFF2-40B4-BE49-F238E27FC236}">
-                  <a16:creationId xmlns:a16="http://schemas.microsoft.com/office/drawing/2014/main" id="{921B9819-24F6-4BC0-A672-E03D40AFD479}"/>
+                  <a16:creationId xmlns:a16="http://schemas.microsoft.com/office/drawing/2014/main" xmlns="" id="{921B9819-24F6-4BC0-A672-E03D40AFD479}"/>
                 </a:ext>
               </a:extLst>
             </p:cNvPr>
@@ -4597,7 +4597,7 @@
               <p:cNvPr id="39" name="Agrupar 38">
                 <a:extLst>
                   <a:ext uri="{FF2B5EF4-FFF2-40B4-BE49-F238E27FC236}">
-                    <a16:creationId xmlns:a16="http://schemas.microsoft.com/office/drawing/2014/main" id="{C5D11EF7-2B6D-438B-8C16-7905E7C7BA79}"/>
+                    <a16:creationId xmlns:a16="http://schemas.microsoft.com/office/drawing/2014/main" xmlns="" id="{C5D11EF7-2B6D-438B-8C16-7905E7C7BA79}"/>
                   </a:ext>
                 </a:extLst>
               </p:cNvPr>
@@ -4620,7 +4620,7 @@
                 <p:cNvPr id="2" name="Retângulo 1">
                   <a:extLst>
                     <a:ext uri="{FF2B5EF4-FFF2-40B4-BE49-F238E27FC236}">
-                      <a16:creationId xmlns:a16="http://schemas.microsoft.com/office/drawing/2014/main" id="{BCBA27BF-C9CC-4848-8830-A51D9B078BA2}"/>
+                      <a16:creationId xmlns:a16="http://schemas.microsoft.com/office/drawing/2014/main" xmlns="" id="{BCBA27BF-C9CC-4848-8830-A51D9B078BA2}"/>
                     </a:ext>
                   </a:extLst>
                 </p:cNvPr>
@@ -4670,7 +4670,7 @@
                 <p:cNvPr id="3" name="Triângulo isósceles 2">
                   <a:extLst>
                     <a:ext uri="{FF2B5EF4-FFF2-40B4-BE49-F238E27FC236}">
-                      <a16:creationId xmlns:a16="http://schemas.microsoft.com/office/drawing/2014/main" id="{01278A0F-F650-49CC-9C71-A954AF3E3627}"/>
+                      <a16:creationId xmlns:a16="http://schemas.microsoft.com/office/drawing/2014/main" xmlns="" id="{01278A0F-F650-49CC-9C71-A954AF3E3627}"/>
                     </a:ext>
                   </a:extLst>
                 </p:cNvPr>
@@ -4723,7 +4723,7 @@
               <p:cNvPr id="41" name="Agrupar 40">
                 <a:extLst>
                   <a:ext uri="{FF2B5EF4-FFF2-40B4-BE49-F238E27FC236}">
-                    <a16:creationId xmlns:a16="http://schemas.microsoft.com/office/drawing/2014/main" id="{6487E750-9CD4-4130-A7BD-EBF054BB268D}"/>
+                    <a16:creationId xmlns:a16="http://schemas.microsoft.com/office/drawing/2014/main" xmlns="" id="{6487E750-9CD4-4130-A7BD-EBF054BB268D}"/>
                   </a:ext>
                 </a:extLst>
               </p:cNvPr>
@@ -4743,7 +4743,7 @@
                 <p:cNvPr id="40" name="Retângulo: Cantos Arredondados 39">
                   <a:extLst>
                     <a:ext uri="{FF2B5EF4-FFF2-40B4-BE49-F238E27FC236}">
-                      <a16:creationId xmlns:a16="http://schemas.microsoft.com/office/drawing/2014/main" id="{B47E0044-725B-4A8D-9CFB-C769D7B19065}"/>
+                      <a16:creationId xmlns:a16="http://schemas.microsoft.com/office/drawing/2014/main" xmlns="" id="{B47E0044-725B-4A8D-9CFB-C769D7B19065}"/>
                     </a:ext>
                   </a:extLst>
                 </p:cNvPr>
@@ -4797,7 +4797,7 @@
                 <p:cNvPr id="43" name="Retângulo: Cantos Arredondados 42">
                   <a:extLst>
                     <a:ext uri="{FF2B5EF4-FFF2-40B4-BE49-F238E27FC236}">
-                      <a16:creationId xmlns:a16="http://schemas.microsoft.com/office/drawing/2014/main" id="{EB4CF4E3-6D90-4B5A-BFD2-BBEC1C6D1D2B}"/>
+                      <a16:creationId xmlns:a16="http://schemas.microsoft.com/office/drawing/2014/main" xmlns="" id="{EB4CF4E3-6D90-4B5A-BFD2-BBEC1C6D1D2B}"/>
                     </a:ext>
                   </a:extLst>
                 </p:cNvPr>
@@ -4854,7 +4854,7 @@
           <p:cNvPr id="55" name="Agrupar 54">
             <a:extLst>
               <a:ext uri="{FF2B5EF4-FFF2-40B4-BE49-F238E27FC236}">
-                <a16:creationId xmlns:a16="http://schemas.microsoft.com/office/drawing/2014/main" id="{CC999F4B-E85E-4AEA-B45E-AD36C88FBEE2}"/>
+                <a16:creationId xmlns:a16="http://schemas.microsoft.com/office/drawing/2014/main" xmlns="" id="{CC999F4B-E85E-4AEA-B45E-AD36C88FBEE2}"/>
               </a:ext>
             </a:extLst>
           </p:cNvPr>
@@ -4874,7 +4874,7 @@
             <p:cNvPr id="49" name="Grupo 5">
               <a:extLst>
                 <a:ext uri="{FF2B5EF4-FFF2-40B4-BE49-F238E27FC236}">
-                  <a16:creationId xmlns:a16="http://schemas.microsoft.com/office/drawing/2014/main" id="{99FAE24C-9A47-419B-B5E5-D4D808CA5418}"/>
+                  <a16:creationId xmlns:a16="http://schemas.microsoft.com/office/drawing/2014/main" xmlns="" id="{99FAE24C-9A47-419B-B5E5-D4D808CA5418}"/>
                 </a:ext>
               </a:extLst>
             </p:cNvPr>
@@ -4894,7 +4894,7 @@
               <p:cNvPr id="50" name="Retângulo de cantos arredondados 4">
                 <a:extLst>
                   <a:ext uri="{FF2B5EF4-FFF2-40B4-BE49-F238E27FC236}">
-                    <a16:creationId xmlns:a16="http://schemas.microsoft.com/office/drawing/2014/main" id="{70B9A222-8692-41C6-A567-6CF1F7554F5C}"/>
+                    <a16:creationId xmlns:a16="http://schemas.microsoft.com/office/drawing/2014/main" xmlns="" id="{70B9A222-8692-41C6-A567-6CF1F7554F5C}"/>
                   </a:ext>
                 </a:extLst>
               </p:cNvPr>
@@ -4946,7 +4946,7 @@
               <p:cNvPr id="51" name="Retângulo de cantos arredondados 3">
                 <a:extLst>
                   <a:ext uri="{FF2B5EF4-FFF2-40B4-BE49-F238E27FC236}">
-                    <a16:creationId xmlns:a16="http://schemas.microsoft.com/office/drawing/2014/main" id="{4A451C11-9122-415F-8310-23BDA0CCEB9F}"/>
+                    <a16:creationId xmlns:a16="http://schemas.microsoft.com/office/drawing/2014/main" xmlns="" id="{4A451C11-9122-415F-8310-23BDA0CCEB9F}"/>
                   </a:ext>
                 </a:extLst>
               </p:cNvPr>
@@ -4999,7 +4999,7 @@
             <p:cNvPr id="48" name="Agrupar 47">
               <a:extLst>
                 <a:ext uri="{FF2B5EF4-FFF2-40B4-BE49-F238E27FC236}">
-                  <a16:creationId xmlns:a16="http://schemas.microsoft.com/office/drawing/2014/main" id="{01E6FE0D-EF5E-4B81-8E69-CCE4DF60E417}"/>
+                  <a16:creationId xmlns:a16="http://schemas.microsoft.com/office/drawing/2014/main" xmlns="" id="{01E6FE0D-EF5E-4B81-8E69-CCE4DF60E417}"/>
                 </a:ext>
               </a:extLst>
             </p:cNvPr>
@@ -5019,7 +5019,7 @@
               <p:cNvPr id="52" name="Retângulo: Cantos Arredondados 51">
                 <a:extLst>
                   <a:ext uri="{FF2B5EF4-FFF2-40B4-BE49-F238E27FC236}">
-                    <a16:creationId xmlns:a16="http://schemas.microsoft.com/office/drawing/2014/main" id="{5DFCB4A5-DEBD-45F9-9DF1-047740DB4031}"/>
+                    <a16:creationId xmlns:a16="http://schemas.microsoft.com/office/drawing/2014/main" xmlns="" id="{5DFCB4A5-DEBD-45F9-9DF1-047740DB4031}"/>
                   </a:ext>
                 </a:extLst>
               </p:cNvPr>
@@ -5073,7 +5073,7 @@
               <p:cNvPr id="53" name="Retângulo: Cantos Arredondados 52">
                 <a:extLst>
                   <a:ext uri="{FF2B5EF4-FFF2-40B4-BE49-F238E27FC236}">
-                    <a16:creationId xmlns:a16="http://schemas.microsoft.com/office/drawing/2014/main" id="{FA7BB6B9-EF2A-4DAF-9EDF-E6A071F57AF4}"/>
+                    <a16:creationId xmlns:a16="http://schemas.microsoft.com/office/drawing/2014/main" xmlns="" id="{FA7BB6B9-EF2A-4DAF-9EDF-E6A071F57AF4}"/>
                   </a:ext>
                 </a:extLst>
               </p:cNvPr>
@@ -5129,7 +5129,7 @@
           <p:cNvPr id="58" name="Grupo 5">
             <a:extLst>
               <a:ext uri="{FF2B5EF4-FFF2-40B4-BE49-F238E27FC236}">
-                <a16:creationId xmlns:a16="http://schemas.microsoft.com/office/drawing/2014/main" id="{7D002B77-70EE-4473-BB68-F794F4D52831}"/>
+                <a16:creationId xmlns:a16="http://schemas.microsoft.com/office/drawing/2014/main" xmlns="" id="{7D002B77-70EE-4473-BB68-F794F4D52831}"/>
               </a:ext>
             </a:extLst>
           </p:cNvPr>
@@ -5149,7 +5149,7 @@
             <p:cNvPr id="62" name="Retângulo de cantos arredondados 4">
               <a:extLst>
                 <a:ext uri="{FF2B5EF4-FFF2-40B4-BE49-F238E27FC236}">
-                  <a16:creationId xmlns:a16="http://schemas.microsoft.com/office/drawing/2014/main" id="{65331E93-0DE6-4054-AF21-2468BC3BB699}"/>
+                  <a16:creationId xmlns:a16="http://schemas.microsoft.com/office/drawing/2014/main" xmlns="" id="{65331E93-0DE6-4054-AF21-2468BC3BB699}"/>
                 </a:ext>
               </a:extLst>
             </p:cNvPr>
@@ -5201,7 +5201,7 @@
             <p:cNvPr id="63" name="Retângulo de cantos arredondados 3">
               <a:extLst>
                 <a:ext uri="{FF2B5EF4-FFF2-40B4-BE49-F238E27FC236}">
-                  <a16:creationId xmlns:a16="http://schemas.microsoft.com/office/drawing/2014/main" id="{C13A9B07-2392-4559-8955-F0429C0E18EE}"/>
+                  <a16:creationId xmlns:a16="http://schemas.microsoft.com/office/drawing/2014/main" xmlns="" id="{C13A9B07-2392-4559-8955-F0429C0E18EE}"/>
                 </a:ext>
               </a:extLst>
             </p:cNvPr>
@@ -5254,7 +5254,7 @@
           <p:cNvPr id="56" name="Agrupar 55">
             <a:extLst>
               <a:ext uri="{FF2B5EF4-FFF2-40B4-BE49-F238E27FC236}">
-                <a16:creationId xmlns:a16="http://schemas.microsoft.com/office/drawing/2014/main" id="{C6F4B90A-76E0-43AB-A334-677C42D1EF82}"/>
+                <a16:creationId xmlns:a16="http://schemas.microsoft.com/office/drawing/2014/main" xmlns="" id="{C6F4B90A-76E0-43AB-A334-677C42D1EF82}"/>
               </a:ext>
             </a:extLst>
           </p:cNvPr>
@@ -5274,7 +5274,7 @@
             <p:cNvPr id="60" name="Retângulo: Cantos Arredondados 59">
               <a:extLst>
                 <a:ext uri="{FF2B5EF4-FFF2-40B4-BE49-F238E27FC236}">
-                  <a16:creationId xmlns:a16="http://schemas.microsoft.com/office/drawing/2014/main" id="{30230895-0946-4CCB-9F63-F3F450AE3BE0}"/>
+                  <a16:creationId xmlns:a16="http://schemas.microsoft.com/office/drawing/2014/main" xmlns="" id="{30230895-0946-4CCB-9F63-F3F450AE3BE0}"/>
                 </a:ext>
               </a:extLst>
             </p:cNvPr>
@@ -5328,7 +5328,7 @@
             <p:cNvPr id="64" name="Retângulo: Cantos Arredondados 63">
               <a:extLst>
                 <a:ext uri="{FF2B5EF4-FFF2-40B4-BE49-F238E27FC236}">
-                  <a16:creationId xmlns:a16="http://schemas.microsoft.com/office/drawing/2014/main" id="{63BBC6D7-0996-4AEC-A041-A0A8820713DF}"/>
+                  <a16:creationId xmlns:a16="http://schemas.microsoft.com/office/drawing/2014/main" xmlns="" id="{63BBC6D7-0996-4AEC-A041-A0A8820713DF}"/>
                 </a:ext>
               </a:extLst>
             </p:cNvPr>
@@ -5383,7 +5383,7 @@
           <p:cNvPr id="69" name="Agrupar 68">
             <a:extLst>
               <a:ext uri="{FF2B5EF4-FFF2-40B4-BE49-F238E27FC236}">
-                <a16:creationId xmlns:a16="http://schemas.microsoft.com/office/drawing/2014/main" id="{B9297464-F285-47B5-AD99-2272741F0331}"/>
+                <a16:creationId xmlns:a16="http://schemas.microsoft.com/office/drawing/2014/main" xmlns="" id="{B9297464-F285-47B5-AD99-2272741F0331}"/>
               </a:ext>
             </a:extLst>
           </p:cNvPr>
@@ -5403,7 +5403,7 @@
             <p:cNvPr id="66" name="Grupo 5">
               <a:extLst>
                 <a:ext uri="{FF2B5EF4-FFF2-40B4-BE49-F238E27FC236}">
-                  <a16:creationId xmlns:a16="http://schemas.microsoft.com/office/drawing/2014/main" id="{9C076C78-C551-4EAE-BEF8-98359C47A9C9}"/>
+                  <a16:creationId xmlns:a16="http://schemas.microsoft.com/office/drawing/2014/main" xmlns="" id="{9C076C78-C551-4EAE-BEF8-98359C47A9C9}"/>
                 </a:ext>
               </a:extLst>
             </p:cNvPr>
@@ -5423,7 +5423,7 @@
               <p:cNvPr id="67" name="Retângulo de cantos arredondados 4">
                 <a:extLst>
                   <a:ext uri="{FF2B5EF4-FFF2-40B4-BE49-F238E27FC236}">
-                    <a16:creationId xmlns:a16="http://schemas.microsoft.com/office/drawing/2014/main" id="{7D6D2002-712C-4155-AD49-D59432320B29}"/>
+                    <a16:creationId xmlns:a16="http://schemas.microsoft.com/office/drawing/2014/main" xmlns="" id="{7D6D2002-712C-4155-AD49-D59432320B29}"/>
                   </a:ext>
                 </a:extLst>
               </p:cNvPr>
@@ -5475,7 +5475,7 @@
               <p:cNvPr id="68" name="Retângulo de cantos arredondados 3">
                 <a:extLst>
                   <a:ext uri="{FF2B5EF4-FFF2-40B4-BE49-F238E27FC236}">
-                    <a16:creationId xmlns:a16="http://schemas.microsoft.com/office/drawing/2014/main" id="{91E414C2-E632-4A7B-BFD1-5BECB4DFA6F1}"/>
+                    <a16:creationId xmlns:a16="http://schemas.microsoft.com/office/drawing/2014/main" xmlns="" id="{91E414C2-E632-4A7B-BFD1-5BECB4DFA6F1}"/>
                   </a:ext>
                 </a:extLst>
               </p:cNvPr>
@@ -5528,7 +5528,7 @@
             <p:cNvPr id="65" name="Elipse 64">
               <a:extLst>
                 <a:ext uri="{FF2B5EF4-FFF2-40B4-BE49-F238E27FC236}">
-                  <a16:creationId xmlns:a16="http://schemas.microsoft.com/office/drawing/2014/main" id="{E7C3CB91-AE61-4E55-8A27-17432F982FF7}"/>
+                  <a16:creationId xmlns:a16="http://schemas.microsoft.com/office/drawing/2014/main" xmlns="" id="{E7C3CB91-AE61-4E55-8A27-17432F982FF7}"/>
                 </a:ext>
               </a:extLst>
             </p:cNvPr>
@@ -5581,7 +5581,7 @@
           <p:cNvPr id="70" name="Agrupar 69">
             <a:extLst>
               <a:ext uri="{FF2B5EF4-FFF2-40B4-BE49-F238E27FC236}">
-                <a16:creationId xmlns:a16="http://schemas.microsoft.com/office/drawing/2014/main" id="{8CC59306-40BE-4E0B-9553-AFE6EF449EB4}"/>
+                <a16:creationId xmlns:a16="http://schemas.microsoft.com/office/drawing/2014/main" xmlns="" id="{8CC59306-40BE-4E0B-9553-AFE6EF449EB4}"/>
               </a:ext>
             </a:extLst>
           </p:cNvPr>
@@ -5601,7 +5601,7 @@
             <p:cNvPr id="72" name="Grupo 5">
               <a:extLst>
                 <a:ext uri="{FF2B5EF4-FFF2-40B4-BE49-F238E27FC236}">
-                  <a16:creationId xmlns:a16="http://schemas.microsoft.com/office/drawing/2014/main" id="{B9390DF4-C03D-4748-9EF0-5B8DAD2C456E}"/>
+                  <a16:creationId xmlns:a16="http://schemas.microsoft.com/office/drawing/2014/main" xmlns="" id="{B9390DF4-C03D-4748-9EF0-5B8DAD2C456E}"/>
                 </a:ext>
               </a:extLst>
             </p:cNvPr>
@@ -5621,7 +5621,7 @@
               <p:cNvPr id="74" name="Retângulo de cantos arredondados 4">
                 <a:extLst>
                   <a:ext uri="{FF2B5EF4-FFF2-40B4-BE49-F238E27FC236}">
-                    <a16:creationId xmlns:a16="http://schemas.microsoft.com/office/drawing/2014/main" id="{50B1A16C-79D9-40E3-9B83-CF42B3B3553D}"/>
+                    <a16:creationId xmlns:a16="http://schemas.microsoft.com/office/drawing/2014/main" xmlns="" id="{50B1A16C-79D9-40E3-9B83-CF42B3B3553D}"/>
                   </a:ext>
                 </a:extLst>
               </p:cNvPr>
@@ -5673,7 +5673,7 @@
               <p:cNvPr id="75" name="Retângulo de cantos arredondados 3">
                 <a:extLst>
                   <a:ext uri="{FF2B5EF4-FFF2-40B4-BE49-F238E27FC236}">
-                    <a16:creationId xmlns:a16="http://schemas.microsoft.com/office/drawing/2014/main" id="{A867D93C-71CF-489E-B492-F457CB8DB2E9}"/>
+                    <a16:creationId xmlns:a16="http://schemas.microsoft.com/office/drawing/2014/main" xmlns="" id="{A867D93C-71CF-489E-B492-F457CB8DB2E9}"/>
                   </a:ext>
                 </a:extLst>
               </p:cNvPr>
@@ -5726,7 +5726,7 @@
             <p:cNvPr id="77" name="Retângulo: Cantos Arredondados 76">
               <a:extLst>
                 <a:ext uri="{FF2B5EF4-FFF2-40B4-BE49-F238E27FC236}">
-                  <a16:creationId xmlns:a16="http://schemas.microsoft.com/office/drawing/2014/main" id="{579EE6B5-9F8F-42A2-81E7-6F11DD9E1F01}"/>
+                  <a16:creationId xmlns:a16="http://schemas.microsoft.com/office/drawing/2014/main" xmlns="" id="{579EE6B5-9F8F-42A2-81E7-6F11DD9E1F01}"/>
                 </a:ext>
               </a:extLst>
             </p:cNvPr>
@@ -5781,7 +5781,7 @@
           <p:cNvPr id="94" name="Agrupar 93">
             <a:extLst>
               <a:ext uri="{FF2B5EF4-FFF2-40B4-BE49-F238E27FC236}">
-                <a16:creationId xmlns:a16="http://schemas.microsoft.com/office/drawing/2014/main" id="{8D2375F7-E009-4263-A5E6-641D1E016033}"/>
+                <a16:creationId xmlns:a16="http://schemas.microsoft.com/office/drawing/2014/main" xmlns="" id="{8D2375F7-E009-4263-A5E6-641D1E016033}"/>
               </a:ext>
             </a:extLst>
           </p:cNvPr>
@@ -5801,7 +5801,7 @@
             <p:cNvPr id="80" name="Grupo 5">
               <a:extLst>
                 <a:ext uri="{FF2B5EF4-FFF2-40B4-BE49-F238E27FC236}">
-                  <a16:creationId xmlns:a16="http://schemas.microsoft.com/office/drawing/2014/main" id="{6AE50179-0E37-4D1C-B372-1FDAF63B500C}"/>
+                  <a16:creationId xmlns:a16="http://schemas.microsoft.com/office/drawing/2014/main" xmlns="" id="{6AE50179-0E37-4D1C-B372-1FDAF63B500C}"/>
                 </a:ext>
               </a:extLst>
             </p:cNvPr>
@@ -5821,7 +5821,7 @@
               <p:cNvPr id="82" name="Retângulo de cantos arredondados 4">
                 <a:extLst>
                   <a:ext uri="{FF2B5EF4-FFF2-40B4-BE49-F238E27FC236}">
-                    <a16:creationId xmlns:a16="http://schemas.microsoft.com/office/drawing/2014/main" id="{B67DC444-FB10-4306-8305-60597E9DE30A}"/>
+                    <a16:creationId xmlns:a16="http://schemas.microsoft.com/office/drawing/2014/main" xmlns="" id="{B67DC444-FB10-4306-8305-60597E9DE30A}"/>
                   </a:ext>
                 </a:extLst>
               </p:cNvPr>
@@ -5873,7 +5873,7 @@
               <p:cNvPr id="83" name="Retângulo de cantos arredondados 3">
                 <a:extLst>
                   <a:ext uri="{FF2B5EF4-FFF2-40B4-BE49-F238E27FC236}">
-                    <a16:creationId xmlns:a16="http://schemas.microsoft.com/office/drawing/2014/main" id="{F5A06FD6-A110-4E8E-BA4A-320907088840}"/>
+                    <a16:creationId xmlns:a16="http://schemas.microsoft.com/office/drawing/2014/main" xmlns="" id="{F5A06FD6-A110-4E8E-BA4A-320907088840}"/>
                   </a:ext>
                 </a:extLst>
               </p:cNvPr>
@@ -5926,7 +5926,7 @@
             <p:cNvPr id="93" name="Agrupar 92">
               <a:extLst>
                 <a:ext uri="{FF2B5EF4-FFF2-40B4-BE49-F238E27FC236}">
-                  <a16:creationId xmlns:a16="http://schemas.microsoft.com/office/drawing/2014/main" id="{E34A69FF-1F7B-4694-A8F7-3B7B60C202E4}"/>
+                  <a16:creationId xmlns:a16="http://schemas.microsoft.com/office/drawing/2014/main" xmlns="" id="{E34A69FF-1F7B-4694-A8F7-3B7B60C202E4}"/>
                 </a:ext>
               </a:extLst>
             </p:cNvPr>
@@ -5946,7 +5946,7 @@
               <p:cNvPr id="89" name="Elipse 88">
                 <a:extLst>
                   <a:ext uri="{FF2B5EF4-FFF2-40B4-BE49-F238E27FC236}">
-                    <a16:creationId xmlns:a16="http://schemas.microsoft.com/office/drawing/2014/main" id="{F3E16FC3-C9E1-4EAD-BD23-7518F656366C}"/>
+                    <a16:creationId xmlns:a16="http://schemas.microsoft.com/office/drawing/2014/main" xmlns="" id="{F3E16FC3-C9E1-4EAD-BD23-7518F656366C}"/>
                   </a:ext>
                 </a:extLst>
               </p:cNvPr>
@@ -5998,7 +5998,7 @@
               <p:cNvPr id="78" name="Agrupar 77">
                 <a:extLst>
                   <a:ext uri="{FF2B5EF4-FFF2-40B4-BE49-F238E27FC236}">
-                    <a16:creationId xmlns:a16="http://schemas.microsoft.com/office/drawing/2014/main" id="{139201A2-B41B-459E-962C-EAA888D61B18}"/>
+                    <a16:creationId xmlns:a16="http://schemas.microsoft.com/office/drawing/2014/main" xmlns="" id="{139201A2-B41B-459E-962C-EAA888D61B18}"/>
                   </a:ext>
                 </a:extLst>
               </p:cNvPr>
@@ -6018,7 +6018,7 @@
                 <p:cNvPr id="91" name="Retângulo: Cantos Arredondados 90">
                   <a:extLst>
                     <a:ext uri="{FF2B5EF4-FFF2-40B4-BE49-F238E27FC236}">
-                      <a16:creationId xmlns:a16="http://schemas.microsoft.com/office/drawing/2014/main" id="{4184B59F-05B1-4611-9024-BCBC89881708}"/>
+                      <a16:creationId xmlns:a16="http://schemas.microsoft.com/office/drawing/2014/main" xmlns="" id="{4184B59F-05B1-4611-9024-BCBC89881708}"/>
                     </a:ext>
                   </a:extLst>
                 </p:cNvPr>
@@ -6072,7 +6072,7 @@
                 <p:cNvPr id="92" name="Elipse 91">
                   <a:extLst>
                     <a:ext uri="{FF2B5EF4-FFF2-40B4-BE49-F238E27FC236}">
-                      <a16:creationId xmlns:a16="http://schemas.microsoft.com/office/drawing/2014/main" id="{661A3906-3547-44A8-9CCD-CD80B357AC45}"/>
+                      <a16:creationId xmlns:a16="http://schemas.microsoft.com/office/drawing/2014/main" xmlns="" id="{661A3906-3547-44A8-9CCD-CD80B357AC45}"/>
                     </a:ext>
                   </a:extLst>
                 </p:cNvPr>
@@ -6124,10 +6124,401 @@
       </p:grpSp>
       <p:grpSp>
         <p:nvGrpSpPr>
+          <p:cNvPr id="57" name="Grupo 56"/>
+          <p:cNvGrpSpPr/>
+          <p:nvPr/>
+        </p:nvGrpSpPr>
+        <p:grpSpPr>
+          <a:xfrm>
+            <a:off x="4283968" y="2368068"/>
+            <a:ext cx="360040" cy="722251"/>
+            <a:chOff x="3917208" y="2438143"/>
+            <a:chExt cx="360040" cy="596742"/>
+          </a:xfrm>
+        </p:grpSpPr>
+        <p:sp>
+          <p:nvSpPr>
+            <p:cNvPr id="42" name="Retângulo 41"/>
+            <p:cNvSpPr/>
+            <p:nvPr/>
+          </p:nvSpPr>
+          <p:spPr>
+            <a:xfrm>
+              <a:off x="3917208" y="2694910"/>
+              <a:ext cx="360040" cy="129039"/>
+            </a:xfrm>
+            <a:prstGeom prst="rect">
+              <a:avLst/>
+            </a:prstGeom>
+            <a:solidFill>
+              <a:srgbClr val="595959"/>
+            </a:solidFill>
+            <a:ln>
+              <a:noFill/>
+            </a:ln>
+          </p:spPr>
+          <p:style>
+            <a:lnRef idx="2">
+              <a:schemeClr val="accent1">
+                <a:shade val="50000"/>
+              </a:schemeClr>
+            </a:lnRef>
+            <a:fillRef idx="1">
+              <a:schemeClr val="accent1"/>
+            </a:fillRef>
+            <a:effectRef idx="0">
+              <a:schemeClr val="accent1"/>
+            </a:effectRef>
+            <a:fontRef idx="minor">
+              <a:schemeClr val="lt1"/>
+            </a:fontRef>
+          </p:style>
+          <p:txBody>
+            <a:bodyPr rtlCol="0" anchor="ctr"/>
+            <a:lstStyle/>
+            <a:p>
+              <a:pPr algn="ctr"/>
+              <a:endParaRPr lang="pt-BR"/>
+            </a:p>
+          </p:txBody>
+        </p:sp>
+        <p:grpSp>
+          <p:nvGrpSpPr>
+            <p:cNvPr id="54" name="Grupo 53"/>
+            <p:cNvGrpSpPr/>
+            <p:nvPr/>
+          </p:nvGrpSpPr>
+          <p:grpSpPr>
+            <a:xfrm>
+              <a:off x="3917208" y="2438143"/>
+              <a:ext cx="360040" cy="596742"/>
+              <a:chOff x="3917208" y="2416953"/>
+              <a:chExt cx="360040" cy="596742"/>
+            </a:xfrm>
+          </p:grpSpPr>
+          <p:sp>
+            <p:nvSpPr>
+              <p:cNvPr id="107" name="Retângulo de cantos arredondados 3">
+                <a:extLst>
+                  <a:ext uri="{FF2B5EF4-FFF2-40B4-BE49-F238E27FC236}">
+                    <a16:creationId xmlns:a16="http://schemas.microsoft.com/office/drawing/2014/main" xmlns="" id="{4A451C11-9122-415F-8310-23BDA0CCEB9F}"/>
+                  </a:ext>
+                </a:extLst>
+              </p:cNvPr>
+              <p:cNvSpPr/>
+              <p:nvPr/>
+            </p:nvSpPr>
+            <p:spPr>
+              <a:xfrm>
+                <a:off x="3917208" y="2416953"/>
+                <a:ext cx="360040" cy="333704"/>
+              </a:xfrm>
+              <a:prstGeom prst="roundRect">
+                <a:avLst/>
+              </a:prstGeom>
+              <a:solidFill>
+                <a:srgbClr val="595959"/>
+              </a:solidFill>
+              <a:ln>
+                <a:noFill/>
+              </a:ln>
+            </p:spPr>
+            <p:style>
+              <a:lnRef idx="2">
+                <a:schemeClr val="accent1">
+                  <a:shade val="50000"/>
+                </a:schemeClr>
+              </a:lnRef>
+              <a:fillRef idx="1">
+                <a:schemeClr val="accent1"/>
+              </a:fillRef>
+              <a:effectRef idx="0">
+                <a:schemeClr val="accent1"/>
+              </a:effectRef>
+              <a:fontRef idx="minor">
+                <a:schemeClr val="lt1"/>
+              </a:fontRef>
+            </p:style>
+            <p:txBody>
+              <a:bodyPr rtlCol="0" anchor="ctr"/>
+              <a:lstStyle/>
+              <a:p>
+                <a:pPr algn="ctr"/>
+                <a:endParaRPr lang="pt-BR"/>
+              </a:p>
+            </p:txBody>
+          </p:sp>
+          <p:grpSp>
+            <p:nvGrpSpPr>
+              <p:cNvPr id="46" name="Grupo 45"/>
+              <p:cNvGrpSpPr/>
+              <p:nvPr/>
+            </p:nvGrpSpPr>
+            <p:grpSpPr>
+              <a:xfrm>
+                <a:off x="3917208" y="2691806"/>
+                <a:ext cx="360040" cy="321889"/>
+                <a:chOff x="3917208" y="2691806"/>
+                <a:chExt cx="360040" cy="321889"/>
+              </a:xfrm>
+            </p:grpSpPr>
+            <p:grpSp>
+              <p:nvGrpSpPr>
+                <p:cNvPr id="110" name="Grupo 5">
+                  <a:extLst>
+                    <a:ext uri="{FF2B5EF4-FFF2-40B4-BE49-F238E27FC236}">
+                      <a16:creationId xmlns:a16="http://schemas.microsoft.com/office/drawing/2014/main" xmlns="" id="{99FAE24C-9A47-419B-B5E5-D4D808CA5418}"/>
+                    </a:ext>
+                  </a:extLst>
+                </p:cNvPr>
+                <p:cNvGrpSpPr/>
+                <p:nvPr/>
+              </p:nvGrpSpPr>
+              <p:grpSpPr>
+                <a:xfrm>
+                  <a:off x="3917208" y="2708279"/>
+                  <a:ext cx="360040" cy="305416"/>
+                  <a:chOff x="1475656" y="1557337"/>
+                  <a:chExt cx="2088232" cy="2189202"/>
+                </a:xfrm>
+              </p:grpSpPr>
+              <p:sp>
+                <p:nvSpPr>
+                  <p:cNvPr id="114" name="Retângulo de cantos arredondados 4">
+                    <a:extLst>
+                      <a:ext uri="{FF2B5EF4-FFF2-40B4-BE49-F238E27FC236}">
+                        <a16:creationId xmlns:a16="http://schemas.microsoft.com/office/drawing/2014/main" xmlns="" id="{70B9A222-8692-41C6-A567-6CF1F7554F5C}"/>
+                      </a:ext>
+                    </a:extLst>
+                  </p:cNvPr>
+                  <p:cNvSpPr/>
+                  <p:nvPr/>
+                </p:nvSpPr>
+                <p:spPr>
+                  <a:xfrm>
+                    <a:off x="1475656" y="1658328"/>
+                    <a:ext cx="2088232" cy="2088211"/>
+                  </a:xfrm>
+                  <a:prstGeom prst="roundRect">
+                    <a:avLst/>
+                  </a:prstGeom>
+                  <a:solidFill>
+                    <a:srgbClr val="4B4B4B"/>
+                  </a:solidFill>
+                  <a:ln>
+                    <a:noFill/>
+                  </a:ln>
+                </p:spPr>
+                <p:style>
+                  <a:lnRef idx="2">
+                    <a:schemeClr val="accent1">
+                      <a:shade val="50000"/>
+                    </a:schemeClr>
+                  </a:lnRef>
+                  <a:fillRef idx="1">
+                    <a:schemeClr val="accent1"/>
+                  </a:fillRef>
+                  <a:effectRef idx="0">
+                    <a:schemeClr val="accent1"/>
+                  </a:effectRef>
+                  <a:fontRef idx="minor">
+                    <a:schemeClr val="lt1"/>
+                  </a:fontRef>
+                </p:style>
+                <p:txBody>
+                  <a:bodyPr rtlCol="0" anchor="ctr"/>
+                  <a:lstStyle/>
+                  <a:p>
+                    <a:pPr algn="ctr"/>
+                    <a:endParaRPr lang="pt-BR"/>
+                  </a:p>
+                </p:txBody>
+              </p:sp>
+              <p:sp>
+                <p:nvSpPr>
+                  <p:cNvPr id="115" name="Retângulo de cantos arredondados 3">
+                    <a:extLst>
+                      <a:ext uri="{FF2B5EF4-FFF2-40B4-BE49-F238E27FC236}">
+                        <a16:creationId xmlns:a16="http://schemas.microsoft.com/office/drawing/2014/main" xmlns="" id="{4A451C11-9122-415F-8310-23BDA0CCEB9F}"/>
+                      </a:ext>
+                    </a:extLst>
+                  </p:cNvPr>
+                  <p:cNvSpPr/>
+                  <p:nvPr/>
+                </p:nvSpPr>
+                <p:spPr>
+                  <a:xfrm>
+                    <a:off x="1475656" y="1557337"/>
+                    <a:ext cx="2088232" cy="1908901"/>
+                  </a:xfrm>
+                  <a:prstGeom prst="roundRect">
+                    <a:avLst/>
+                  </a:prstGeom>
+                  <a:solidFill>
+                    <a:srgbClr val="595959"/>
+                  </a:solidFill>
+                  <a:ln>
+                    <a:noFill/>
+                  </a:ln>
+                </p:spPr>
+                <p:style>
+                  <a:lnRef idx="2">
+                    <a:schemeClr val="accent1">
+                      <a:shade val="50000"/>
+                    </a:schemeClr>
+                  </a:lnRef>
+                  <a:fillRef idx="1">
+                    <a:schemeClr val="accent1"/>
+                  </a:fillRef>
+                  <a:effectRef idx="0">
+                    <a:schemeClr val="accent1"/>
+                  </a:effectRef>
+                  <a:fontRef idx="minor">
+                    <a:schemeClr val="lt1"/>
+                  </a:fontRef>
+                </p:style>
+                <p:txBody>
+                  <a:bodyPr rtlCol="0" anchor="ctr"/>
+                  <a:lstStyle/>
+                  <a:p>
+                    <a:pPr algn="ctr"/>
+                    <a:endParaRPr lang="pt-BR"/>
+                  </a:p>
+                </p:txBody>
+              </p:sp>
+            </p:grpSp>
+            <p:grpSp>
+              <p:nvGrpSpPr>
+                <p:cNvPr id="44" name="Grupo 43"/>
+                <p:cNvGrpSpPr/>
+                <p:nvPr/>
+              </p:nvGrpSpPr>
+              <p:grpSpPr>
+                <a:xfrm>
+                  <a:off x="4026713" y="2691806"/>
+                  <a:ext cx="141030" cy="79893"/>
+                  <a:chOff x="4026368" y="2693906"/>
+                  <a:chExt cx="141030" cy="79893"/>
+                </a:xfrm>
+              </p:grpSpPr>
+              <p:sp>
+                <p:nvSpPr>
+                  <p:cNvPr id="116" name="Retângulo: Cantos Arredondados 59">
+                    <a:extLst>
+                      <a:ext uri="{FF2B5EF4-FFF2-40B4-BE49-F238E27FC236}">
+                        <a16:creationId xmlns:a16="http://schemas.microsoft.com/office/drawing/2014/main" xmlns="" id="{30230895-0946-4CCB-9F63-F3F450AE3BE0}"/>
+                      </a:ext>
+                    </a:extLst>
+                  </p:cNvPr>
+                  <p:cNvSpPr/>
+                  <p:nvPr/>
+                </p:nvSpPr>
+                <p:spPr>
+                  <a:xfrm rot="5423672">
+                    <a:off x="4082857" y="2689259"/>
+                    <a:ext cx="28741" cy="140340"/>
+                  </a:xfrm>
+                  <a:prstGeom prst="roundRect">
+                    <a:avLst>
+                      <a:gd name="adj" fmla="val 50000"/>
+                    </a:avLst>
+                  </a:prstGeom>
+                  <a:solidFill>
+                    <a:schemeClr val="bg1"/>
+                  </a:solidFill>
+                  <a:ln>
+                    <a:noFill/>
+                  </a:ln>
+                </p:spPr>
+                <p:style>
+                  <a:lnRef idx="2">
+                    <a:schemeClr val="accent1">
+                      <a:shade val="50000"/>
+                    </a:schemeClr>
+                  </a:lnRef>
+                  <a:fillRef idx="1">
+                    <a:schemeClr val="accent1"/>
+                  </a:fillRef>
+                  <a:effectRef idx="0">
+                    <a:schemeClr val="accent1"/>
+                  </a:effectRef>
+                  <a:fontRef idx="minor">
+                    <a:schemeClr val="lt1"/>
+                  </a:fontRef>
+                </p:style>
+                <p:txBody>
+                  <a:bodyPr rtlCol="0" anchor="ctr"/>
+                  <a:lstStyle/>
+                  <a:p>
+                    <a:pPr algn="ctr"/>
+                    <a:endParaRPr lang="pt-BR"/>
+                  </a:p>
+                </p:txBody>
+              </p:sp>
+              <p:sp>
+                <p:nvSpPr>
+                  <p:cNvPr id="117" name="Retângulo: Cantos Arredondados 59">
+                    <a:extLst>
+                      <a:ext uri="{FF2B5EF4-FFF2-40B4-BE49-F238E27FC236}">
+                        <a16:creationId xmlns:a16="http://schemas.microsoft.com/office/drawing/2014/main" xmlns="" id="{30230895-0946-4CCB-9F63-F3F450AE3BE0}"/>
+                      </a:ext>
+                    </a:extLst>
+                  </p:cNvPr>
+                  <p:cNvSpPr/>
+                  <p:nvPr/>
+                </p:nvSpPr>
+                <p:spPr>
+                  <a:xfrm rot="5423672">
+                    <a:off x="4082167" y="2638107"/>
+                    <a:ext cx="28741" cy="140340"/>
+                  </a:xfrm>
+                  <a:prstGeom prst="roundRect">
+                    <a:avLst>
+                      <a:gd name="adj" fmla="val 50000"/>
+                    </a:avLst>
+                  </a:prstGeom>
+                  <a:solidFill>
+                    <a:schemeClr val="bg1"/>
+                  </a:solidFill>
+                  <a:ln>
+                    <a:noFill/>
+                  </a:ln>
+                </p:spPr>
+                <p:style>
+                  <a:lnRef idx="2">
+                    <a:schemeClr val="accent1">
+                      <a:shade val="50000"/>
+                    </a:schemeClr>
+                  </a:lnRef>
+                  <a:fillRef idx="1">
+                    <a:schemeClr val="accent1"/>
+                  </a:fillRef>
+                  <a:effectRef idx="0">
+                    <a:schemeClr val="accent1"/>
+                  </a:effectRef>
+                  <a:fontRef idx="minor">
+                    <a:schemeClr val="lt1"/>
+                  </a:fontRef>
+                </p:style>
+                <p:txBody>
+                  <a:bodyPr rtlCol="0" anchor="ctr"/>
+                  <a:lstStyle/>
+                  <a:p>
+                    <a:pPr algn="ctr"/>
+                    <a:endParaRPr lang="pt-BR"/>
+                  </a:p>
+                </p:txBody>
+              </p:sp>
+            </p:grpSp>
+          </p:grpSp>
+        </p:grpSp>
+      </p:grpSp>
+      <p:grpSp>
+        <p:nvGrpSpPr>
           <p:cNvPr id="108" name="Agrupar 107">
             <a:extLst>
               <a:ext uri="{FF2B5EF4-FFF2-40B4-BE49-F238E27FC236}">
-                <a16:creationId xmlns:a16="http://schemas.microsoft.com/office/drawing/2014/main" id="{C6B88D39-5910-460D-9315-35F91DD0D906}"/>
+                <a16:creationId xmlns:a16="http://schemas.microsoft.com/office/drawing/2014/main" xmlns="" id="{C6B88D39-5910-460D-9315-35F91DD0D906}"/>
               </a:ext>
             </a:extLst>
           </p:cNvPr>
@@ -6147,7 +6538,7 @@
             <p:cNvPr id="97" name="Grupo 5">
               <a:extLst>
                 <a:ext uri="{FF2B5EF4-FFF2-40B4-BE49-F238E27FC236}">
-                  <a16:creationId xmlns:a16="http://schemas.microsoft.com/office/drawing/2014/main" id="{6A60F903-6D54-41A1-8365-6C2ED805D97D}"/>
+                  <a16:creationId xmlns:a16="http://schemas.microsoft.com/office/drawing/2014/main" xmlns="" id="{6A60F903-6D54-41A1-8365-6C2ED805D97D}"/>
                 </a:ext>
               </a:extLst>
             </p:cNvPr>
@@ -6167,7 +6558,7 @@
               <p:cNvPr id="103" name="Retângulo de cantos arredondados 4">
                 <a:extLst>
                   <a:ext uri="{FF2B5EF4-FFF2-40B4-BE49-F238E27FC236}">
-                    <a16:creationId xmlns:a16="http://schemas.microsoft.com/office/drawing/2014/main" id="{17808EF1-A609-4488-A0A6-10F425359517}"/>
+                    <a16:creationId xmlns:a16="http://schemas.microsoft.com/office/drawing/2014/main" xmlns="" id="{17808EF1-A609-4488-A0A6-10F425359517}"/>
                   </a:ext>
                 </a:extLst>
               </p:cNvPr>
@@ -6219,7 +6610,7 @@
               <p:cNvPr id="104" name="Retângulo de cantos arredondados 3">
                 <a:extLst>
                   <a:ext uri="{FF2B5EF4-FFF2-40B4-BE49-F238E27FC236}">
-                    <a16:creationId xmlns:a16="http://schemas.microsoft.com/office/drawing/2014/main" id="{3B10CE38-6B0E-4F77-ACF4-5A864CB07A65}"/>
+                    <a16:creationId xmlns:a16="http://schemas.microsoft.com/office/drawing/2014/main" xmlns="" id="{3B10CE38-6B0E-4F77-ACF4-5A864CB07A65}"/>
                   </a:ext>
                 </a:extLst>
               </p:cNvPr>
@@ -6272,7 +6663,7 @@
             <p:cNvPr id="95" name="Agrupar 94">
               <a:extLst>
                 <a:ext uri="{FF2B5EF4-FFF2-40B4-BE49-F238E27FC236}">
-                  <a16:creationId xmlns:a16="http://schemas.microsoft.com/office/drawing/2014/main" id="{A9D88936-C0CF-4488-86BB-47EB6BF85630}"/>
+                  <a16:creationId xmlns:a16="http://schemas.microsoft.com/office/drawing/2014/main" xmlns="" id="{A9D88936-C0CF-4488-86BB-47EB6BF85630}"/>
                 </a:ext>
               </a:extLst>
             </p:cNvPr>
@@ -6292,7 +6683,7 @@
               <p:cNvPr id="101" name="Retângulo: Cantos Arredondados 100">
                 <a:extLst>
                   <a:ext uri="{FF2B5EF4-FFF2-40B4-BE49-F238E27FC236}">
-                    <a16:creationId xmlns:a16="http://schemas.microsoft.com/office/drawing/2014/main" id="{84114832-712D-40D0-BD76-AAC8D45740AA}"/>
+                    <a16:creationId xmlns:a16="http://schemas.microsoft.com/office/drawing/2014/main" xmlns="" id="{84114832-712D-40D0-BD76-AAC8D45740AA}"/>
                   </a:ext>
                 </a:extLst>
               </p:cNvPr>
@@ -6346,7 +6737,7 @@
               <p:cNvPr id="105" name="Retângulo: Cantos Arredondados 104">
                 <a:extLst>
                   <a:ext uri="{FF2B5EF4-FFF2-40B4-BE49-F238E27FC236}">
-                    <a16:creationId xmlns:a16="http://schemas.microsoft.com/office/drawing/2014/main" id="{278BBF47-0C33-4457-9720-AD3EA9243EDC}"/>
+                    <a16:creationId xmlns:a16="http://schemas.microsoft.com/office/drawing/2014/main" xmlns="" id="{278BBF47-0C33-4457-9720-AD3EA9243EDC}"/>
                   </a:ext>
                 </a:extLst>
               </p:cNvPr>
@@ -6400,7 +6791,7 @@
               <p:cNvPr id="106" name="Retângulo: Cantos Arredondados 105">
                 <a:extLst>
                   <a:ext uri="{FF2B5EF4-FFF2-40B4-BE49-F238E27FC236}">
-                    <a16:creationId xmlns:a16="http://schemas.microsoft.com/office/drawing/2014/main" id="{E631551F-9ED4-4277-ABE8-B94188B05695}"/>
+                    <a16:creationId xmlns:a16="http://schemas.microsoft.com/office/drawing/2014/main" xmlns="" id="{E631551F-9ED4-4277-ABE8-B94188B05695}"/>
                   </a:ext>
                 </a:extLst>
               </p:cNvPr>

</xml_diff>